<commit_message>
Added more to presentation outline
</commit_message>
<xml_diff>
--- a/Data Mining Project.pptx
+++ b/Data Mining Project.pptx
@@ -6,11 +6,16 @@
   </p:sldMasterIdLst>
   <p:sldIdLst>
     <p:sldId id="256" r:id="rId2"/>
-    <p:sldId id="257" r:id="rId3"/>
-    <p:sldId id="258" r:id="rId4"/>
-    <p:sldId id="259" r:id="rId5"/>
-    <p:sldId id="260" r:id="rId6"/>
-    <p:sldId id="261" r:id="rId7"/>
+    <p:sldId id="262" r:id="rId3"/>
+    <p:sldId id="263" r:id="rId4"/>
+    <p:sldId id="264" r:id="rId5"/>
+    <p:sldId id="265" r:id="rId6"/>
+    <p:sldId id="257" r:id="rId7"/>
+    <p:sldId id="266" r:id="rId8"/>
+    <p:sldId id="258" r:id="rId9"/>
+    <p:sldId id="259" r:id="rId10"/>
+    <p:sldId id="260" r:id="rId11"/>
+    <p:sldId id="261" r:id="rId12"/>
   </p:sldIdLst>
   <p:sldSz cx="12192000" cy="6858000"/>
   <p:notesSz cx="6858000" cy="9144000"/>
@@ -109,6 +114,11 @@
       </a:defRPr>
     </a:lvl9pPr>
   </p:defaultTextStyle>
+  <p:extLst>
+    <p:ext uri="{EFAFB233-063F-42B5-8137-9DF3F51BA10A}">
+      <p15:sldGuideLst xmlns:p15="http://schemas.microsoft.com/office/powerpoint/2012/main"/>
+    </p:ext>
+  </p:extLst>
 </p:presentation>
 </file>
 
@@ -124,17 +134,25 @@
 <pc:chgInfo xmlns:a="http://schemas.openxmlformats.org/drawingml/2006/main" xmlns:r="http://schemas.openxmlformats.org/officeDocument/2006/relationships" xmlns:ac="http://schemas.microsoft.com/office/drawing/2013/main/command" xmlns:pc="http://schemas.microsoft.com/office/powerpoint/2013/main/command">
   <pc:docChgLst>
     <pc:chgData name="Russo, Dominick" userId="ac913056-28be-481e-bd9b-a61f757ee110" providerId="ADAL" clId="{18686A97-791D-43AD-ABBC-545FE93A2998}"/>
-    <pc:docChg chg="undo custSel modSld">
-      <pc:chgData name="Russo, Dominick" userId="ac913056-28be-481e-bd9b-a61f757ee110" providerId="ADAL" clId="{18686A97-791D-43AD-ABBC-545FE93A2998}" dt="2021-03-31T00:36:34.689" v="271" actId="27636"/>
+    <pc:docChg chg="undo custSel addSld modSld">
+      <pc:chgData name="Russo, Dominick" userId="ac913056-28be-481e-bd9b-a61f757ee110" providerId="ADAL" clId="{18686A97-791D-43AD-ABBC-545FE93A2998}" dt="2021-04-01T00:15:16.601" v="748" actId="20577"/>
       <pc:docMkLst>
         <pc:docMk/>
       </pc:docMkLst>
       <pc:sldChg chg="modSp mod">
-        <pc:chgData name="Russo, Dominick" userId="ac913056-28be-481e-bd9b-a61f757ee110" providerId="ADAL" clId="{18686A97-791D-43AD-ABBC-545FE93A2998}" dt="2021-03-31T00:32:16.670" v="90" actId="20577"/>
+        <pc:chgData name="Russo, Dominick" userId="ac913056-28be-481e-bd9b-a61f757ee110" providerId="ADAL" clId="{18686A97-791D-43AD-ABBC-545FE93A2998}" dt="2021-04-01T00:14:22.892" v="661" actId="20577"/>
         <pc:sldMkLst>
           <pc:docMk/>
           <pc:sldMk cId="3561893636" sldId="257"/>
         </pc:sldMkLst>
+        <pc:spChg chg="mod">
+          <ac:chgData name="Russo, Dominick" userId="ac913056-28be-481e-bd9b-a61f757ee110" providerId="ADAL" clId="{18686A97-791D-43AD-ABBC-545FE93A2998}" dt="2021-04-01T00:14:22.892" v="661" actId="20577"/>
+          <ac:spMkLst>
+            <pc:docMk/>
+            <pc:sldMk cId="3561893636" sldId="257"/>
+            <ac:spMk id="2" creationId="{D53BA0B7-F362-4798-876E-235EACCF04B2}"/>
+          </ac:spMkLst>
+        </pc:spChg>
         <pc:spChg chg="mod">
           <ac:chgData name="Russo, Dominick" userId="ac913056-28be-481e-bd9b-a61f757ee110" providerId="ADAL" clId="{18686A97-791D-43AD-ABBC-545FE93A2998}" dt="2021-03-31T00:32:16.670" v="90" actId="20577"/>
           <ac:spMkLst>
@@ -145,17 +163,48 @@
         </pc:spChg>
       </pc:sldChg>
       <pc:sldChg chg="modSp mod">
-        <pc:chgData name="Russo, Dominick" userId="ac913056-28be-481e-bd9b-a61f757ee110" providerId="ADAL" clId="{18686A97-791D-43AD-ABBC-545FE93A2998}" dt="2021-03-31T00:34:06.933" v="238" actId="20577"/>
+        <pc:chgData name="Russo, Dominick" userId="ac913056-28be-481e-bd9b-a61f757ee110" providerId="ADAL" clId="{18686A97-791D-43AD-ABBC-545FE93A2998}" dt="2021-04-01T00:14:13.053" v="625" actId="20577"/>
         <pc:sldMkLst>
           <pc:docMk/>
           <pc:sldMk cId="1945820125" sldId="258"/>
         </pc:sldMkLst>
+        <pc:spChg chg="mod">
+          <ac:chgData name="Russo, Dominick" userId="ac913056-28be-481e-bd9b-a61f757ee110" providerId="ADAL" clId="{18686A97-791D-43AD-ABBC-545FE93A2998}" dt="2021-04-01T00:14:13.053" v="625" actId="20577"/>
+          <ac:spMkLst>
+            <pc:docMk/>
+            <pc:sldMk cId="1945820125" sldId="258"/>
+            <ac:spMk id="2" creationId="{EC323391-294B-4D3F-A2AB-EDE24C72573B}"/>
+          </ac:spMkLst>
+        </pc:spChg>
         <pc:spChg chg="mod">
           <ac:chgData name="Russo, Dominick" userId="ac913056-28be-481e-bd9b-a61f757ee110" providerId="ADAL" clId="{18686A97-791D-43AD-ABBC-545FE93A2998}" dt="2021-03-31T00:34:06.933" v="238" actId="20577"/>
           <ac:spMkLst>
             <pc:docMk/>
             <pc:sldMk cId="1945820125" sldId="258"/>
             <ac:spMk id="3" creationId="{0BECCC59-21B5-4F53-B3F3-03B475260E11}"/>
+          </ac:spMkLst>
+        </pc:spChg>
+      </pc:sldChg>
+      <pc:sldChg chg="modSp mod">
+        <pc:chgData name="Russo, Dominick" userId="ac913056-28be-481e-bd9b-a61f757ee110" providerId="ADAL" clId="{18686A97-791D-43AD-ABBC-545FE93A2998}" dt="2021-04-01T00:15:16.601" v="748" actId="20577"/>
+        <pc:sldMkLst>
+          <pc:docMk/>
+          <pc:sldMk cId="745880702" sldId="259"/>
+        </pc:sldMkLst>
+        <pc:spChg chg="mod">
+          <ac:chgData name="Russo, Dominick" userId="ac913056-28be-481e-bd9b-a61f757ee110" providerId="ADAL" clId="{18686A97-791D-43AD-ABBC-545FE93A2998}" dt="2021-04-01T00:15:09.778" v="738" actId="20577"/>
+          <ac:spMkLst>
+            <pc:docMk/>
+            <pc:sldMk cId="745880702" sldId="259"/>
+            <ac:spMk id="2" creationId="{BC01F367-4FAC-4606-821B-F225EB50AF43}"/>
+          </ac:spMkLst>
+        </pc:spChg>
+        <pc:spChg chg="mod">
+          <ac:chgData name="Russo, Dominick" userId="ac913056-28be-481e-bd9b-a61f757ee110" providerId="ADAL" clId="{18686A97-791D-43AD-ABBC-545FE93A2998}" dt="2021-04-01T00:15:16.601" v="748" actId="20577"/>
+          <ac:spMkLst>
+            <pc:docMk/>
+            <pc:sldMk cId="745880702" sldId="259"/>
+            <ac:spMk id="3" creationId="{4768E18A-BE94-4DDF-AFD6-160D73EC2FE4}"/>
           </ac:spMkLst>
         </pc:spChg>
       </pc:sldChg>
@@ -182,6 +231,113 @@
           </ac:spMkLst>
         </pc:spChg>
       </pc:sldChg>
+      <pc:sldChg chg="modSp new mod">
+        <pc:chgData name="Russo, Dominick" userId="ac913056-28be-481e-bd9b-a61f757ee110" providerId="ADAL" clId="{18686A97-791D-43AD-ABBC-545FE93A2998}" dt="2021-04-01T00:10:51.536" v="281" actId="5793"/>
+        <pc:sldMkLst>
+          <pc:docMk/>
+          <pc:sldMk cId="2237146868" sldId="262"/>
+        </pc:sldMkLst>
+        <pc:spChg chg="mod">
+          <ac:chgData name="Russo, Dominick" userId="ac913056-28be-481e-bd9b-a61f757ee110" providerId="ADAL" clId="{18686A97-791D-43AD-ABBC-545FE93A2998}" dt="2021-04-01T00:10:51.536" v="281" actId="5793"/>
+          <ac:spMkLst>
+            <pc:docMk/>
+            <pc:sldMk cId="2237146868" sldId="262"/>
+            <ac:spMk id="2" creationId="{6E3C2344-AD83-4259-8AFE-E21033AA0F15}"/>
+          </ac:spMkLst>
+        </pc:spChg>
+      </pc:sldChg>
+      <pc:sldChg chg="modSp new mod">
+        <pc:chgData name="Russo, Dominick" userId="ac913056-28be-481e-bd9b-a61f757ee110" providerId="ADAL" clId="{18686A97-791D-43AD-ABBC-545FE93A2998}" dt="2021-04-01T00:13:45.399" v="589" actId="20577"/>
+        <pc:sldMkLst>
+          <pc:docMk/>
+          <pc:sldMk cId="372263730" sldId="263"/>
+        </pc:sldMkLst>
+        <pc:spChg chg="mod">
+          <ac:chgData name="Russo, Dominick" userId="ac913056-28be-481e-bd9b-a61f757ee110" providerId="ADAL" clId="{18686A97-791D-43AD-ABBC-545FE93A2998}" dt="2021-04-01T00:11:14.842" v="305" actId="20577"/>
+          <ac:spMkLst>
+            <pc:docMk/>
+            <pc:sldMk cId="372263730" sldId="263"/>
+            <ac:spMk id="2" creationId="{6403880E-0C47-4C54-989F-A2B30700AE7C}"/>
+          </ac:spMkLst>
+        </pc:spChg>
+        <pc:spChg chg="mod">
+          <ac:chgData name="Russo, Dominick" userId="ac913056-28be-481e-bd9b-a61f757ee110" providerId="ADAL" clId="{18686A97-791D-43AD-ABBC-545FE93A2998}" dt="2021-04-01T00:13:45.399" v="589" actId="20577"/>
+          <ac:spMkLst>
+            <pc:docMk/>
+            <pc:sldMk cId="372263730" sldId="263"/>
+            <ac:spMk id="3" creationId="{9A7E300B-1621-4A70-A2A6-EBDF8C710A7A}"/>
+          </ac:spMkLst>
+        </pc:spChg>
+      </pc:sldChg>
+      <pc:sldChg chg="modSp new mod">
+        <pc:chgData name="Russo, Dominick" userId="ac913056-28be-481e-bd9b-a61f757ee110" providerId="ADAL" clId="{18686A97-791D-43AD-ABBC-545FE93A2998}" dt="2021-04-01T00:12:34.856" v="454" actId="20577"/>
+        <pc:sldMkLst>
+          <pc:docMk/>
+          <pc:sldMk cId="3069617171" sldId="264"/>
+        </pc:sldMkLst>
+        <pc:spChg chg="mod">
+          <ac:chgData name="Russo, Dominick" userId="ac913056-28be-481e-bd9b-a61f757ee110" providerId="ADAL" clId="{18686A97-791D-43AD-ABBC-545FE93A2998}" dt="2021-04-01T00:11:26.097" v="313" actId="20577"/>
+          <ac:spMkLst>
+            <pc:docMk/>
+            <pc:sldMk cId="3069617171" sldId="264"/>
+            <ac:spMk id="2" creationId="{0D8BC1D8-BD28-4C94-AEB7-D33585B9079D}"/>
+          </ac:spMkLst>
+        </pc:spChg>
+        <pc:spChg chg="mod">
+          <ac:chgData name="Russo, Dominick" userId="ac913056-28be-481e-bd9b-a61f757ee110" providerId="ADAL" clId="{18686A97-791D-43AD-ABBC-545FE93A2998}" dt="2021-04-01T00:12:34.856" v="454" actId="20577"/>
+          <ac:spMkLst>
+            <pc:docMk/>
+            <pc:sldMk cId="3069617171" sldId="264"/>
+            <ac:spMk id="3" creationId="{C67A47FA-641A-4AE8-8E20-146F18F1602B}"/>
+          </ac:spMkLst>
+        </pc:spChg>
+      </pc:sldChg>
+      <pc:sldChg chg="modSp new mod">
+        <pc:chgData name="Russo, Dominick" userId="ac913056-28be-481e-bd9b-a61f757ee110" providerId="ADAL" clId="{18686A97-791D-43AD-ABBC-545FE93A2998}" dt="2021-04-01T00:13:31.117" v="569" actId="313"/>
+        <pc:sldMkLst>
+          <pc:docMk/>
+          <pc:sldMk cId="3843785652" sldId="265"/>
+        </pc:sldMkLst>
+        <pc:spChg chg="mod">
+          <ac:chgData name="Russo, Dominick" userId="ac913056-28be-481e-bd9b-a61f757ee110" providerId="ADAL" clId="{18686A97-791D-43AD-ABBC-545FE93A2998}" dt="2021-04-01T00:12:46.566" v="471" actId="20577"/>
+          <ac:spMkLst>
+            <pc:docMk/>
+            <pc:sldMk cId="3843785652" sldId="265"/>
+            <ac:spMk id="2" creationId="{5E2928AD-351A-4339-8520-EE014E97C2AA}"/>
+          </ac:spMkLst>
+        </pc:spChg>
+        <pc:spChg chg="mod">
+          <ac:chgData name="Russo, Dominick" userId="ac913056-28be-481e-bd9b-a61f757ee110" providerId="ADAL" clId="{18686A97-791D-43AD-ABBC-545FE93A2998}" dt="2021-04-01T00:13:31.117" v="569" actId="313"/>
+          <ac:spMkLst>
+            <pc:docMk/>
+            <pc:sldMk cId="3843785652" sldId="265"/>
+            <ac:spMk id="3" creationId="{01672235-C895-4E00-BF00-E6819073AA78}"/>
+          </ac:spMkLst>
+        </pc:spChg>
+      </pc:sldChg>
+      <pc:sldChg chg="modSp new mod">
+        <pc:chgData name="Russo, Dominick" userId="ac913056-28be-481e-bd9b-a61f757ee110" providerId="ADAL" clId="{18686A97-791D-43AD-ABBC-545FE93A2998}" dt="2021-04-01T00:14:55.004" v="707" actId="20577"/>
+        <pc:sldMkLst>
+          <pc:docMk/>
+          <pc:sldMk cId="3757042173" sldId="266"/>
+        </pc:sldMkLst>
+        <pc:spChg chg="mod">
+          <ac:chgData name="Russo, Dominick" userId="ac913056-28be-481e-bd9b-a61f757ee110" providerId="ADAL" clId="{18686A97-791D-43AD-ABBC-545FE93A2998}" dt="2021-04-01T00:14:51.656" v="697" actId="20577"/>
+          <ac:spMkLst>
+            <pc:docMk/>
+            <pc:sldMk cId="3757042173" sldId="266"/>
+            <ac:spMk id="2" creationId="{CA80252C-D5FB-4D19-9B3F-F12C2DC9F84C}"/>
+          </ac:spMkLst>
+        </pc:spChg>
+        <pc:spChg chg="mod">
+          <ac:chgData name="Russo, Dominick" userId="ac913056-28be-481e-bd9b-a61f757ee110" providerId="ADAL" clId="{18686A97-791D-43AD-ABBC-545FE93A2998}" dt="2021-04-01T00:14:55.004" v="707" actId="20577"/>
+          <ac:spMkLst>
+            <pc:docMk/>
+            <pc:sldMk cId="3757042173" sldId="266"/>
+            <ac:spMk id="3" creationId="{0F6B2AA9-9B12-47CD-82EE-906D0F04B888}"/>
+          </ac:spMkLst>
+        </pc:spChg>
+      </pc:sldChg>
     </pc:docChg>
   </pc:docChgLst>
 </pc:chgInfo>
@@ -334,7 +490,7 @@
           <a:p>
             <a:fld id="{F260A7E5-A30E-4E63-B175-1CF7A0DB8AB1}" type="datetimeFigureOut">
               <a:rPr lang="en-US" smtClean="0"/>
-              <a:t>3/30/2021</a:t>
+              <a:t>3/31/2021</a:t>
             </a:fld>
             <a:endParaRPr lang="en-US"/>
           </a:p>
@@ -532,7 +688,7 @@
           <a:p>
             <a:fld id="{F260A7E5-A30E-4E63-B175-1CF7A0DB8AB1}" type="datetimeFigureOut">
               <a:rPr lang="en-US" smtClean="0"/>
-              <a:t>3/30/2021</a:t>
+              <a:t>3/31/2021</a:t>
             </a:fld>
             <a:endParaRPr lang="en-US"/>
           </a:p>
@@ -740,7 +896,7 @@
           <a:p>
             <a:fld id="{F260A7E5-A30E-4E63-B175-1CF7A0DB8AB1}" type="datetimeFigureOut">
               <a:rPr lang="en-US" smtClean="0"/>
-              <a:t>3/30/2021</a:t>
+              <a:t>3/31/2021</a:t>
             </a:fld>
             <a:endParaRPr lang="en-US"/>
           </a:p>
@@ -938,7 +1094,7 @@
           <a:p>
             <a:fld id="{F260A7E5-A30E-4E63-B175-1CF7A0DB8AB1}" type="datetimeFigureOut">
               <a:rPr lang="en-US" smtClean="0"/>
-              <a:t>3/30/2021</a:t>
+              <a:t>3/31/2021</a:t>
             </a:fld>
             <a:endParaRPr lang="en-US"/>
           </a:p>
@@ -1213,7 +1369,7 @@
           <a:p>
             <a:fld id="{F260A7E5-A30E-4E63-B175-1CF7A0DB8AB1}" type="datetimeFigureOut">
               <a:rPr lang="en-US" smtClean="0"/>
-              <a:t>3/30/2021</a:t>
+              <a:t>3/31/2021</a:t>
             </a:fld>
             <a:endParaRPr lang="en-US"/>
           </a:p>
@@ -1478,7 +1634,7 @@
           <a:p>
             <a:fld id="{F260A7E5-A30E-4E63-B175-1CF7A0DB8AB1}" type="datetimeFigureOut">
               <a:rPr lang="en-US" smtClean="0"/>
-              <a:t>3/30/2021</a:t>
+              <a:t>3/31/2021</a:t>
             </a:fld>
             <a:endParaRPr lang="en-US"/>
           </a:p>
@@ -1890,7 +2046,7 @@
           <a:p>
             <a:fld id="{F260A7E5-A30E-4E63-B175-1CF7A0DB8AB1}" type="datetimeFigureOut">
               <a:rPr lang="en-US" smtClean="0"/>
-              <a:t>3/30/2021</a:t>
+              <a:t>3/31/2021</a:t>
             </a:fld>
             <a:endParaRPr lang="en-US"/>
           </a:p>
@@ -2031,7 +2187,7 @@
           <a:p>
             <a:fld id="{F260A7E5-A30E-4E63-B175-1CF7A0DB8AB1}" type="datetimeFigureOut">
               <a:rPr lang="en-US" smtClean="0"/>
-              <a:t>3/30/2021</a:t>
+              <a:t>3/31/2021</a:t>
             </a:fld>
             <a:endParaRPr lang="en-US"/>
           </a:p>
@@ -2144,7 +2300,7 @@
           <a:p>
             <a:fld id="{F260A7E5-A30E-4E63-B175-1CF7A0DB8AB1}" type="datetimeFigureOut">
               <a:rPr lang="en-US" smtClean="0"/>
-              <a:t>3/30/2021</a:t>
+              <a:t>3/31/2021</a:t>
             </a:fld>
             <a:endParaRPr lang="en-US"/>
           </a:p>
@@ -2455,7 +2611,7 @@
           <a:p>
             <a:fld id="{F260A7E5-A30E-4E63-B175-1CF7A0DB8AB1}" type="datetimeFigureOut">
               <a:rPr lang="en-US" smtClean="0"/>
-              <a:t>3/30/2021</a:t>
+              <a:t>3/31/2021</a:t>
             </a:fld>
             <a:endParaRPr lang="en-US"/>
           </a:p>
@@ -2743,7 +2899,7 @@
           <a:p>
             <a:fld id="{F260A7E5-A30E-4E63-B175-1CF7A0DB8AB1}" type="datetimeFigureOut">
               <a:rPr lang="en-US" smtClean="0"/>
-              <a:t>3/30/2021</a:t>
+              <a:t>3/31/2021</a:t>
             </a:fld>
             <a:endParaRPr lang="en-US"/>
           </a:p>
@@ -2984,7 +3140,7 @@
           <a:p>
             <a:fld id="{F260A7E5-A30E-4E63-B175-1CF7A0DB8AB1}" type="datetimeFigureOut">
               <a:rPr lang="en-US" smtClean="0"/>
-              <a:t>3/30/2021</a:t>
+              <a:t>3/31/2021</a:t>
             </a:fld>
             <a:endParaRPr lang="en-US"/>
           </a:p>
@@ -3467,6 +3623,233 @@
 </p:sld>
 </file>
 
+<file path=ppt/slides/slide10.xml><?xml version="1.0" encoding="utf-8"?>
+<p:sld xmlns:a="http://schemas.openxmlformats.org/drawingml/2006/main" xmlns:r="http://schemas.openxmlformats.org/officeDocument/2006/relationships" xmlns:p="http://schemas.openxmlformats.org/presentationml/2006/main">
+  <p:cSld>
+    <p:spTree>
+      <p:nvGrpSpPr>
+        <p:cNvPr id="1" name=""/>
+        <p:cNvGrpSpPr/>
+        <p:nvPr/>
+      </p:nvGrpSpPr>
+      <p:grpSpPr>
+        <a:xfrm>
+          <a:off x="0" y="0"/>
+          <a:ext cx="0" cy="0"/>
+          <a:chOff x="0" y="0"/>
+          <a:chExt cx="0" cy="0"/>
+        </a:xfrm>
+      </p:grpSpPr>
+      <p:sp>
+        <p:nvSpPr>
+          <p:cNvPr id="2" name="Title 1">
+            <a:extLst>
+              <a:ext uri="{FF2B5EF4-FFF2-40B4-BE49-F238E27FC236}">
+                <a16:creationId xmlns:a16="http://schemas.microsoft.com/office/drawing/2014/main" id="{4E218467-2286-44AF-BF77-2BFAAF380B10}"/>
+              </a:ext>
+            </a:extLst>
+          </p:cNvPr>
+          <p:cNvSpPr>
+            <a:spLocks noGrp="1"/>
+          </p:cNvSpPr>
+          <p:nvPr>
+            <p:ph type="title"/>
+          </p:nvPr>
+        </p:nvSpPr>
+        <p:spPr/>
+        <p:txBody>
+          <a:bodyPr/>
+          <a:lstStyle/>
+          <a:p>
+            <a:endParaRPr lang="en-US"/>
+          </a:p>
+        </p:txBody>
+      </p:sp>
+      <p:sp>
+        <p:nvSpPr>
+          <p:cNvPr id="3" name="Content Placeholder 2">
+            <a:extLst>
+              <a:ext uri="{FF2B5EF4-FFF2-40B4-BE49-F238E27FC236}">
+                <a16:creationId xmlns:a16="http://schemas.microsoft.com/office/drawing/2014/main" id="{40C2538A-6C5E-4FD7-8C94-7FF0951CE09A}"/>
+              </a:ext>
+            </a:extLst>
+          </p:cNvPr>
+          <p:cNvSpPr>
+            <a:spLocks noGrp="1"/>
+          </p:cNvSpPr>
+          <p:nvPr>
+            <p:ph idx="1"/>
+          </p:nvPr>
+        </p:nvSpPr>
+        <p:spPr/>
+        <p:txBody>
+          <a:bodyPr/>
+          <a:lstStyle/>
+          <a:p>
+            <a:endParaRPr lang="en-US"/>
+          </a:p>
+        </p:txBody>
+      </p:sp>
+    </p:spTree>
+    <p:extLst>
+      <p:ext uri="{BB962C8B-B14F-4D97-AF65-F5344CB8AC3E}">
+        <p14:creationId xmlns:p14="http://schemas.microsoft.com/office/powerpoint/2010/main" val="3581822688"/>
+      </p:ext>
+    </p:extLst>
+  </p:cSld>
+  <p:clrMapOvr>
+    <a:masterClrMapping/>
+  </p:clrMapOvr>
+</p:sld>
+</file>
+
+<file path=ppt/slides/slide11.xml><?xml version="1.0" encoding="utf-8"?>
+<p:sld xmlns:a="http://schemas.openxmlformats.org/drawingml/2006/main" xmlns:r="http://schemas.openxmlformats.org/officeDocument/2006/relationships" xmlns:p="http://schemas.openxmlformats.org/presentationml/2006/main">
+  <p:cSld>
+    <p:spTree>
+      <p:nvGrpSpPr>
+        <p:cNvPr id="1" name=""/>
+        <p:cNvGrpSpPr/>
+        <p:nvPr/>
+      </p:nvGrpSpPr>
+      <p:grpSpPr>
+        <a:xfrm>
+          <a:off x="0" y="0"/>
+          <a:ext cx="0" cy="0"/>
+          <a:chOff x="0" y="0"/>
+          <a:chExt cx="0" cy="0"/>
+        </a:xfrm>
+      </p:grpSpPr>
+      <p:sp>
+        <p:nvSpPr>
+          <p:cNvPr id="2" name="Title 1">
+            <a:extLst>
+              <a:ext uri="{FF2B5EF4-FFF2-40B4-BE49-F238E27FC236}">
+                <a16:creationId xmlns:a16="http://schemas.microsoft.com/office/drawing/2014/main" id="{47D88EF1-D4A3-4229-96D9-72A7DFAAEC8B}"/>
+              </a:ext>
+            </a:extLst>
+          </p:cNvPr>
+          <p:cNvSpPr>
+            <a:spLocks noGrp="1"/>
+          </p:cNvSpPr>
+          <p:nvPr>
+            <p:ph type="title"/>
+          </p:nvPr>
+        </p:nvSpPr>
+        <p:spPr/>
+        <p:txBody>
+          <a:bodyPr/>
+          <a:lstStyle/>
+          <a:p>
+            <a:r>
+              <a:rPr lang="en-US" dirty="0"/>
+              <a:t>Sources</a:t>
+            </a:r>
+          </a:p>
+        </p:txBody>
+      </p:sp>
+      <p:sp>
+        <p:nvSpPr>
+          <p:cNvPr id="3" name="Content Placeholder 2">
+            <a:extLst>
+              <a:ext uri="{FF2B5EF4-FFF2-40B4-BE49-F238E27FC236}">
+                <a16:creationId xmlns:a16="http://schemas.microsoft.com/office/drawing/2014/main" id="{14A2C3C5-FBEE-46D6-90FE-E429135339FC}"/>
+              </a:ext>
+            </a:extLst>
+          </p:cNvPr>
+          <p:cNvSpPr>
+            <a:spLocks noGrp="1"/>
+          </p:cNvSpPr>
+          <p:nvPr>
+            <p:ph idx="1"/>
+          </p:nvPr>
+        </p:nvSpPr>
+        <p:spPr/>
+        <p:txBody>
+          <a:bodyPr>
+            <a:normAutofit fontScale="92500" lnSpcReduction="10000"/>
+          </a:bodyPr>
+          <a:lstStyle/>
+          <a:p>
+            <a:r>
+              <a:rPr lang="en-US" dirty="0"/>
+              <a:t>SVD: </a:t>
+            </a:r>
+            <a:r>
+              <a:rPr lang="en-US" dirty="0">
+                <a:hlinkClick r:id="rId2"/>
+              </a:rPr>
+              <a:t>https://towardsdatascience.com/recommender-system-singular-value-decomposition-svd-truncated-svd-97096338f361</a:t>
+            </a:r>
+            <a:endParaRPr lang="en-US" dirty="0"/>
+          </a:p>
+          <a:p>
+            <a:endParaRPr lang="en-US" dirty="0"/>
+          </a:p>
+          <a:p>
+            <a:r>
+              <a:rPr lang="en-US"/>
+              <a:t>SVD: </a:t>
+            </a:r>
+            <a:r>
+              <a:rPr lang="en-US">
+                <a:hlinkClick r:id="rId3"/>
+              </a:rPr>
+              <a:t>https://analyticsindiamag.com/singular-value-decomposition-svd-application-recommender-system/</a:t>
+            </a:r>
+            <a:endParaRPr lang="en-US"/>
+          </a:p>
+          <a:p>
+            <a:endParaRPr lang="en-US" dirty="0"/>
+          </a:p>
+          <a:p>
+            <a:r>
+              <a:rPr lang="en-US" dirty="0"/>
+              <a:t>Memory based KNN: </a:t>
+            </a:r>
+            <a:r>
+              <a:rPr lang="en-US" dirty="0">
+                <a:hlinkClick r:id="rId4"/>
+              </a:rPr>
+              <a:t>https://towardsdatascience.com/how-to-build-a-memory-based-recommendation-system-using-python-surprise-55f3257b2cf4</a:t>
+            </a:r>
+            <a:endParaRPr lang="en-US" dirty="0"/>
+          </a:p>
+          <a:p>
+            <a:r>
+              <a:rPr lang="en-US" dirty="0" err="1"/>
+              <a:t>AzureML</a:t>
+            </a:r>
+            <a:r>
+              <a:rPr lang="en-US" dirty="0"/>
+              <a:t> Matchstick: </a:t>
+            </a:r>
+            <a:r>
+              <a:rPr lang="en-US" dirty="0">
+                <a:hlinkClick r:id="rId5"/>
+              </a:rPr>
+              <a:t>https://docs.microsoft.com/en-us/azure/machine-learning/studio-module-reference/train-matchbox-recommender</a:t>
+            </a:r>
+            <a:endParaRPr lang="en-US" dirty="0"/>
+          </a:p>
+          <a:p>
+            <a:endParaRPr lang="en-US" dirty="0"/>
+          </a:p>
+        </p:txBody>
+      </p:sp>
+    </p:spTree>
+    <p:extLst>
+      <p:ext uri="{BB962C8B-B14F-4D97-AF65-F5344CB8AC3E}">
+        <p14:creationId xmlns:p14="http://schemas.microsoft.com/office/powerpoint/2010/main" val="1230442896"/>
+      </p:ext>
+    </p:extLst>
+  </p:cSld>
+  <p:clrMapOvr>
+    <a:masterClrMapping/>
+  </p:clrMapOvr>
+</p:sld>
+</file>
+
 <file path=ppt/slides/slide2.xml><?xml version="1.0" encoding="utf-8"?>
 <p:sld xmlns:a="http://schemas.openxmlformats.org/drawingml/2006/main" xmlns:r="http://schemas.openxmlformats.org/officeDocument/2006/relationships" xmlns:p="http://schemas.openxmlformats.org/presentationml/2006/main">
   <p:cSld>
@@ -3489,7 +3872,7 @@
           <p:cNvPr id="2" name="Title 1">
             <a:extLst>
               <a:ext uri="{FF2B5EF4-FFF2-40B4-BE49-F238E27FC236}">
-                <a16:creationId xmlns:a16="http://schemas.microsoft.com/office/drawing/2014/main" id="{D53BA0B7-F362-4798-876E-235EACCF04B2}"/>
+                <a16:creationId xmlns:a16="http://schemas.microsoft.com/office/drawing/2014/main" id="{6E3C2344-AD83-4259-8AFE-E21033AA0F15}"/>
               </a:ext>
             </a:extLst>
           </p:cNvPr>
@@ -3505,49 +3888,42 @@
           <a:bodyPr/>
           <a:lstStyle/>
           <a:p>
+            <a:r>
+              <a:rPr lang="en-US" dirty="0"/>
+              <a:t>Outline </a:t>
+            </a:r>
+          </a:p>
+        </p:txBody>
+      </p:sp>
+      <p:sp>
+        <p:nvSpPr>
+          <p:cNvPr id="3" name="Content Placeholder 2">
+            <a:extLst>
+              <a:ext uri="{FF2B5EF4-FFF2-40B4-BE49-F238E27FC236}">
+                <a16:creationId xmlns:a16="http://schemas.microsoft.com/office/drawing/2014/main" id="{A0EB5A28-19A5-4AD2-BA2D-5B6BFD4F45CE}"/>
+              </a:ext>
+            </a:extLst>
+          </p:cNvPr>
+          <p:cNvSpPr>
+            <a:spLocks noGrp="1"/>
+          </p:cNvSpPr>
+          <p:nvPr>
+            <p:ph idx="1"/>
+          </p:nvPr>
+        </p:nvSpPr>
+        <p:spPr/>
+        <p:txBody>
+          <a:bodyPr/>
+          <a:lstStyle/>
+          <a:p>
             <a:endParaRPr lang="en-US"/>
-          </a:p>
-        </p:txBody>
-      </p:sp>
-      <p:sp>
-        <p:nvSpPr>
-          <p:cNvPr id="3" name="Content Placeholder 2">
-            <a:extLst>
-              <a:ext uri="{FF2B5EF4-FFF2-40B4-BE49-F238E27FC236}">
-                <a16:creationId xmlns:a16="http://schemas.microsoft.com/office/drawing/2014/main" id="{32E458F6-BE0F-4CD6-ABF2-F5FD97FF8FFC}"/>
-              </a:ext>
-            </a:extLst>
-          </p:cNvPr>
-          <p:cNvSpPr>
-            <a:spLocks noGrp="1"/>
-          </p:cNvSpPr>
-          <p:nvPr>
-            <p:ph idx="1"/>
-          </p:nvPr>
-        </p:nvSpPr>
-        <p:spPr/>
-        <p:txBody>
-          <a:bodyPr/>
-          <a:lstStyle/>
-          <a:p>
-            <a:r>
-              <a:rPr lang="en-US" dirty="0"/>
-              <a:t>Memory-based Collaborative filtering</a:t>
-            </a:r>
-          </a:p>
-          <a:p>
-            <a:pPr lvl="1"/>
-            <a:r>
-              <a:rPr lang="en-US" dirty="0"/>
-              <a:t>KNN</a:t>
-            </a:r>
           </a:p>
         </p:txBody>
       </p:sp>
     </p:spTree>
     <p:extLst>
       <p:ext uri="{BB962C8B-B14F-4D97-AF65-F5344CB8AC3E}">
-        <p14:creationId xmlns:p14="http://schemas.microsoft.com/office/powerpoint/2010/main" val="3561893636"/>
+        <p14:creationId xmlns:p14="http://schemas.microsoft.com/office/powerpoint/2010/main" val="2237146868"/>
       </p:ext>
     </p:extLst>
   </p:cSld>
@@ -3579,7 +3955,7 @@
           <p:cNvPr id="2" name="Title 1">
             <a:extLst>
               <a:ext uri="{FF2B5EF4-FFF2-40B4-BE49-F238E27FC236}">
-                <a16:creationId xmlns:a16="http://schemas.microsoft.com/office/drawing/2014/main" id="{EC323391-294B-4D3F-A2AB-EDE24C72573B}"/>
+                <a16:creationId xmlns:a16="http://schemas.microsoft.com/office/drawing/2014/main" id="{6403880E-0C47-4C54-989F-A2B30700AE7C}"/>
               </a:ext>
             </a:extLst>
           </p:cNvPr>
@@ -3595,7 +3971,10 @@
           <a:bodyPr/>
           <a:lstStyle/>
           <a:p>
-            <a:endParaRPr lang="en-US"/>
+            <a:r>
+              <a:rPr lang="en-US" dirty="0"/>
+              <a:t>Introduction to project</a:t>
+            </a:r>
           </a:p>
         </p:txBody>
       </p:sp>
@@ -3604,7 +3983,7 @@
           <p:cNvPr id="3" name="Content Placeholder 2">
             <a:extLst>
               <a:ext uri="{FF2B5EF4-FFF2-40B4-BE49-F238E27FC236}">
-                <a16:creationId xmlns:a16="http://schemas.microsoft.com/office/drawing/2014/main" id="{0BECCC59-21B5-4F53-B3F3-03B475260E11}"/>
+                <a16:creationId xmlns:a16="http://schemas.microsoft.com/office/drawing/2014/main" id="{9A7E300B-1621-4A70-A2A6-EBDF8C710A7A}"/>
               </a:ext>
             </a:extLst>
           </p:cNvPr>
@@ -3622,40 +4001,15 @@
           <a:p>
             <a:r>
               <a:rPr lang="en-US" dirty="0"/>
-              <a:t>Model Based Collaborative filtering</a:t>
-            </a:r>
-          </a:p>
-          <a:p>
-            <a:pPr lvl="1"/>
-            <a:r>
-              <a:rPr lang="en-US" dirty="0"/>
-              <a:t>SVD – singular value decomposition</a:t>
-            </a:r>
-          </a:p>
-          <a:p>
-            <a:pPr lvl="1"/>
-            <a:r>
-              <a:rPr lang="en-US" dirty="0"/>
-              <a:t>Recommends based on latent features of item-user matrices</a:t>
-            </a:r>
-          </a:p>
-          <a:p>
-            <a:pPr lvl="1"/>
-            <a:r>
-              <a:rPr lang="en-US" dirty="0"/>
-              <a:t>Provides rating prediction for given user</a:t>
-            </a:r>
-          </a:p>
-          <a:p>
-            <a:pPr lvl="1"/>
-            <a:endParaRPr lang="en-US" dirty="0"/>
+              <a:t>I’m going to …..</a:t>
+            </a:r>
           </a:p>
         </p:txBody>
       </p:sp>
     </p:spTree>
     <p:extLst>
       <p:ext uri="{BB962C8B-B14F-4D97-AF65-F5344CB8AC3E}">
-        <p14:creationId xmlns:p14="http://schemas.microsoft.com/office/powerpoint/2010/main" val="1945820125"/>
+        <p14:creationId xmlns:p14="http://schemas.microsoft.com/office/powerpoint/2010/main" val="372263730"/>
       </p:ext>
     </p:extLst>
   </p:cSld>
@@ -3687,7 +4041,7 @@
           <p:cNvPr id="2" name="Title 1">
             <a:extLst>
               <a:ext uri="{FF2B5EF4-FFF2-40B4-BE49-F238E27FC236}">
-                <a16:creationId xmlns:a16="http://schemas.microsoft.com/office/drawing/2014/main" id="{BC01F367-4FAC-4606-821B-F225EB50AF43}"/>
+                <a16:creationId xmlns:a16="http://schemas.microsoft.com/office/drawing/2014/main" id="{0D8BC1D8-BD28-4C94-AEB7-D33585B9079D}"/>
               </a:ext>
             </a:extLst>
           </p:cNvPr>
@@ -3703,7 +4057,10 @@
           <a:bodyPr/>
           <a:lstStyle/>
           <a:p>
-            <a:endParaRPr lang="en-US"/>
+            <a:r>
+              <a:rPr lang="en-US" dirty="0"/>
+              <a:t>Purpose</a:t>
+            </a:r>
           </a:p>
         </p:txBody>
       </p:sp>
@@ -3712,7 +4069,7 @@
           <p:cNvPr id="3" name="Content Placeholder 2">
             <a:extLst>
               <a:ext uri="{FF2B5EF4-FFF2-40B4-BE49-F238E27FC236}">
-                <a16:creationId xmlns:a16="http://schemas.microsoft.com/office/drawing/2014/main" id="{4768E18A-BE94-4DDF-AFD6-160D73EC2FE4}"/>
+                <a16:creationId xmlns:a16="http://schemas.microsoft.com/office/drawing/2014/main" id="{C67A47FA-641A-4AE8-8E20-146F18F1602B}"/>
               </a:ext>
             </a:extLst>
           </p:cNvPr>
@@ -3728,14 +4085,29 @@
           <a:bodyPr/>
           <a:lstStyle/>
           <a:p>
-            <a:endParaRPr lang="en-US"/>
+            <a:r>
+              <a:rPr lang="en-US" dirty="0"/>
+              <a:t>Statement of purpose</a:t>
+            </a:r>
+          </a:p>
+          <a:p>
+            <a:r>
+              <a:rPr lang="en-US" dirty="0"/>
+              <a:t>“To predict user movie ratings using this and that algorithm”</a:t>
+            </a:r>
+          </a:p>
+          <a:p>
+            <a:r>
+              <a:rPr lang="en-US" dirty="0"/>
+              <a:t>Predict movies???</a:t>
+            </a:r>
           </a:p>
         </p:txBody>
       </p:sp>
     </p:spTree>
     <p:extLst>
       <p:ext uri="{BB962C8B-B14F-4D97-AF65-F5344CB8AC3E}">
-        <p14:creationId xmlns:p14="http://schemas.microsoft.com/office/powerpoint/2010/main" val="745880702"/>
+        <p14:creationId xmlns:p14="http://schemas.microsoft.com/office/powerpoint/2010/main" val="3069617171"/>
       </p:ext>
     </p:extLst>
   </p:cSld>
@@ -3767,7 +4139,7 @@
           <p:cNvPr id="2" name="Title 1">
             <a:extLst>
               <a:ext uri="{FF2B5EF4-FFF2-40B4-BE49-F238E27FC236}">
-                <a16:creationId xmlns:a16="http://schemas.microsoft.com/office/drawing/2014/main" id="{4E218467-2286-44AF-BF77-2BFAAF380B10}"/>
+                <a16:creationId xmlns:a16="http://schemas.microsoft.com/office/drawing/2014/main" id="{5E2928AD-351A-4339-8520-EE014E97C2AA}"/>
               </a:ext>
             </a:extLst>
           </p:cNvPr>
@@ -3783,7 +4155,10 @@
           <a:bodyPr/>
           <a:lstStyle/>
           <a:p>
-            <a:endParaRPr lang="en-US"/>
+            <a:r>
+              <a:rPr lang="en-US" dirty="0"/>
+              <a:t>Dataset overview</a:t>
+            </a:r>
           </a:p>
         </p:txBody>
       </p:sp>
@@ -3792,7 +4167,7 @@
           <p:cNvPr id="3" name="Content Placeholder 2">
             <a:extLst>
               <a:ext uri="{FF2B5EF4-FFF2-40B4-BE49-F238E27FC236}">
-                <a16:creationId xmlns:a16="http://schemas.microsoft.com/office/drawing/2014/main" id="{40C2538A-6C5E-4FD7-8C94-7FF0951CE09A}"/>
+                <a16:creationId xmlns:a16="http://schemas.microsoft.com/office/drawing/2014/main" id="{01672235-C895-4E00-BF00-E6819073AA78}"/>
               </a:ext>
             </a:extLst>
           </p:cNvPr>
@@ -3808,14 +4183,34 @@
           <a:bodyPr/>
           <a:lstStyle/>
           <a:p>
-            <a:endParaRPr lang="en-US"/>
+            <a:r>
+              <a:rPr lang="en-US" dirty="0"/>
+              <a:t>Acquired</a:t>
+            </a:r>
+          </a:p>
+          <a:p>
+            <a:r>
+              <a:rPr lang="en-US" dirty="0"/>
+              <a:t>Instances, attributes</a:t>
+            </a:r>
+          </a:p>
+          <a:p>
+            <a:r>
+              <a:rPr lang="en-US" dirty="0"/>
+              <a:t>No need to clean </a:t>
+            </a:r>
+            <a:r>
+              <a:rPr lang="en-US" dirty="0" err="1"/>
+              <a:t>MovieLens</a:t>
+            </a:r>
+            <a:endParaRPr lang="en-US" dirty="0"/>
           </a:p>
         </p:txBody>
       </p:sp>
     </p:spTree>
     <p:extLst>
       <p:ext uri="{BB962C8B-B14F-4D97-AF65-F5344CB8AC3E}">
-        <p14:creationId xmlns:p14="http://schemas.microsoft.com/office/powerpoint/2010/main" val="3581822688"/>
+        <p14:creationId xmlns:p14="http://schemas.microsoft.com/office/powerpoint/2010/main" val="3843785652"/>
       </p:ext>
     </p:extLst>
   </p:cSld>
@@ -3847,7 +4242,7 @@
           <p:cNvPr id="2" name="Title 1">
             <a:extLst>
               <a:ext uri="{FF2B5EF4-FFF2-40B4-BE49-F238E27FC236}">
-                <a16:creationId xmlns:a16="http://schemas.microsoft.com/office/drawing/2014/main" id="{47D88EF1-D4A3-4229-96D9-72A7DFAAEC8B}"/>
+                <a16:creationId xmlns:a16="http://schemas.microsoft.com/office/drawing/2014/main" id="{D53BA0B7-F362-4798-876E-235EACCF04B2}"/>
               </a:ext>
             </a:extLst>
           </p:cNvPr>
@@ -3865,7 +4260,7 @@
           <a:p>
             <a:r>
               <a:rPr lang="en-US" dirty="0"/>
-              <a:t>Sources</a:t>
+              <a:t>Objective 1 – predict using ….</a:t>
             </a:r>
           </a:p>
         </p:txBody>
@@ -3875,7 +4270,7 @@
           <p:cNvPr id="3" name="Content Placeholder 2">
             <a:extLst>
               <a:ext uri="{FF2B5EF4-FFF2-40B4-BE49-F238E27FC236}">
-                <a16:creationId xmlns:a16="http://schemas.microsoft.com/office/drawing/2014/main" id="{14A2C3C5-FBEE-46D6-90FE-E429135339FC}"/>
+                <a16:creationId xmlns:a16="http://schemas.microsoft.com/office/drawing/2014/main" id="{32E458F6-BE0F-4CD6-ABF2-F5FD97FF8FFC}"/>
               </a:ext>
             </a:extLst>
           </p:cNvPr>
@@ -3888,81 +4283,310 @@
         </p:nvSpPr>
         <p:spPr/>
         <p:txBody>
-          <a:bodyPr>
-            <a:normAutofit fontScale="92500" lnSpcReduction="10000"/>
-          </a:bodyPr>
+          <a:bodyPr/>
           <a:lstStyle/>
           <a:p>
             <a:r>
               <a:rPr lang="en-US" dirty="0"/>
-              <a:t>SVD: </a:t>
-            </a:r>
-            <a:r>
-              <a:rPr lang="en-US" dirty="0">
-                <a:hlinkClick r:id="rId2"/>
-              </a:rPr>
-              <a:t>https://towardsdatascience.com/recommender-system-singular-value-decomposition-svd-truncated-svd-97096338f361</a:t>
-            </a:r>
-            <a:endParaRPr lang="en-US" dirty="0"/>
-          </a:p>
-          <a:p>
-            <a:endParaRPr lang="en-US" dirty="0"/>
-          </a:p>
-          <a:p>
-            <a:r>
-              <a:rPr lang="en-US"/>
-              <a:t>SVD: </a:t>
-            </a:r>
-            <a:r>
-              <a:rPr lang="en-US">
-                <a:hlinkClick r:id="rId3"/>
-              </a:rPr>
-              <a:t>https://analyticsindiamag.com/singular-value-decomposition-svd-application-recommender-system/</a:t>
-            </a:r>
-            <a:endParaRPr lang="en-US"/>
-          </a:p>
-          <a:p>
-            <a:endParaRPr lang="en-US" dirty="0"/>
-          </a:p>
-          <a:p>
+              <a:t>Memory-based Collaborative filtering</a:t>
+            </a:r>
+          </a:p>
+          <a:p>
+            <a:pPr lvl="1"/>
             <a:r>
               <a:rPr lang="en-US" dirty="0"/>
-              <a:t>Memory based KNN: </a:t>
-            </a:r>
-            <a:r>
-              <a:rPr lang="en-US" dirty="0">
-                <a:hlinkClick r:id="rId4"/>
-              </a:rPr>
-              <a:t>https://towardsdatascience.com/how-to-build-a-memory-based-recommendation-system-using-python-surprise-55f3257b2cf4</a:t>
-            </a:r>
-            <a:endParaRPr lang="en-US" dirty="0"/>
-          </a:p>
-          <a:p>
-            <a:r>
-              <a:rPr lang="en-US" dirty="0" err="1"/>
-              <a:t>AzureML</a:t>
-            </a:r>
-            <a:r>
-              <a:rPr lang="en-US" dirty="0"/>
-              <a:t> Matchstick: </a:t>
-            </a:r>
-            <a:r>
-              <a:rPr lang="en-US" dirty="0">
-                <a:hlinkClick r:id="rId5"/>
-              </a:rPr>
-              <a:t>https://docs.microsoft.com/en-us/azure/machine-learning/studio-module-reference/train-matchbox-recommender</a:t>
-            </a:r>
-            <a:endParaRPr lang="en-US" dirty="0"/>
-          </a:p>
-          <a:p>
-            <a:endParaRPr lang="en-US" dirty="0"/>
+              <a:t>KNN</a:t>
+            </a:r>
           </a:p>
         </p:txBody>
       </p:sp>
     </p:spTree>
     <p:extLst>
       <p:ext uri="{BB962C8B-B14F-4D97-AF65-F5344CB8AC3E}">
-        <p14:creationId xmlns:p14="http://schemas.microsoft.com/office/powerpoint/2010/main" val="1230442896"/>
+        <p14:creationId xmlns:p14="http://schemas.microsoft.com/office/powerpoint/2010/main" val="3561893636"/>
+      </p:ext>
+    </p:extLst>
+  </p:cSld>
+  <p:clrMapOvr>
+    <a:masterClrMapping/>
+  </p:clrMapOvr>
+</p:sld>
+</file>
+
+<file path=ppt/slides/slide7.xml><?xml version="1.0" encoding="utf-8"?>
+<p:sld xmlns:a="http://schemas.openxmlformats.org/drawingml/2006/main" xmlns:r="http://schemas.openxmlformats.org/officeDocument/2006/relationships" xmlns:p="http://schemas.openxmlformats.org/presentationml/2006/main">
+  <p:cSld>
+    <p:spTree>
+      <p:nvGrpSpPr>
+        <p:cNvPr id="1" name=""/>
+        <p:cNvGrpSpPr/>
+        <p:nvPr/>
+      </p:nvGrpSpPr>
+      <p:grpSpPr>
+        <a:xfrm>
+          <a:off x="0" y="0"/>
+          <a:ext cx="0" cy="0"/>
+          <a:chOff x="0" y="0"/>
+          <a:chExt cx="0" cy="0"/>
+        </a:xfrm>
+      </p:grpSpPr>
+      <p:sp>
+        <p:nvSpPr>
+          <p:cNvPr id="2" name="Title 1">
+            <a:extLst>
+              <a:ext uri="{FF2B5EF4-FFF2-40B4-BE49-F238E27FC236}">
+                <a16:creationId xmlns:a16="http://schemas.microsoft.com/office/drawing/2014/main" id="{CA80252C-D5FB-4D19-9B3F-F12C2DC9F84C}"/>
+              </a:ext>
+            </a:extLst>
+          </p:cNvPr>
+          <p:cNvSpPr>
+            <a:spLocks noGrp="1"/>
+          </p:cNvSpPr>
+          <p:nvPr>
+            <p:ph type="title"/>
+          </p:nvPr>
+        </p:nvSpPr>
+        <p:spPr/>
+        <p:txBody>
+          <a:bodyPr/>
+          <a:lstStyle/>
+          <a:p>
+            <a:r>
+              <a:rPr lang="en-US" dirty="0"/>
+              <a:t>Objective 1 – Conclusion</a:t>
+            </a:r>
+          </a:p>
+        </p:txBody>
+      </p:sp>
+      <p:sp>
+        <p:nvSpPr>
+          <p:cNvPr id="3" name="Content Placeholder 2">
+            <a:extLst>
+              <a:ext uri="{FF2B5EF4-FFF2-40B4-BE49-F238E27FC236}">
+                <a16:creationId xmlns:a16="http://schemas.microsoft.com/office/drawing/2014/main" id="{0F6B2AA9-9B12-47CD-82EE-906D0F04B888}"/>
+              </a:ext>
+            </a:extLst>
+          </p:cNvPr>
+          <p:cNvSpPr>
+            <a:spLocks noGrp="1"/>
+          </p:cNvSpPr>
+          <p:nvPr>
+            <p:ph idx="1"/>
+          </p:nvPr>
+        </p:nvSpPr>
+        <p:spPr/>
+        <p:txBody>
+          <a:bodyPr/>
+          <a:lstStyle/>
+          <a:p>
+            <a:r>
+              <a:rPr lang="en-US" dirty="0"/>
+              <a:t>evaluation</a:t>
+            </a:r>
+          </a:p>
+        </p:txBody>
+      </p:sp>
+    </p:spTree>
+    <p:extLst>
+      <p:ext uri="{BB962C8B-B14F-4D97-AF65-F5344CB8AC3E}">
+        <p14:creationId xmlns:p14="http://schemas.microsoft.com/office/powerpoint/2010/main" val="3757042173"/>
+      </p:ext>
+    </p:extLst>
+  </p:cSld>
+  <p:clrMapOvr>
+    <a:masterClrMapping/>
+  </p:clrMapOvr>
+</p:sld>
+</file>
+
+<file path=ppt/slides/slide8.xml><?xml version="1.0" encoding="utf-8"?>
+<p:sld xmlns:a="http://schemas.openxmlformats.org/drawingml/2006/main" xmlns:r="http://schemas.openxmlformats.org/officeDocument/2006/relationships" xmlns:p="http://schemas.openxmlformats.org/presentationml/2006/main">
+  <p:cSld>
+    <p:spTree>
+      <p:nvGrpSpPr>
+        <p:cNvPr id="1" name=""/>
+        <p:cNvGrpSpPr/>
+        <p:nvPr/>
+      </p:nvGrpSpPr>
+      <p:grpSpPr>
+        <a:xfrm>
+          <a:off x="0" y="0"/>
+          <a:ext cx="0" cy="0"/>
+          <a:chOff x="0" y="0"/>
+          <a:chExt cx="0" cy="0"/>
+        </a:xfrm>
+      </p:grpSpPr>
+      <p:sp>
+        <p:nvSpPr>
+          <p:cNvPr id="2" name="Title 1">
+            <a:extLst>
+              <a:ext uri="{FF2B5EF4-FFF2-40B4-BE49-F238E27FC236}">
+                <a16:creationId xmlns:a16="http://schemas.microsoft.com/office/drawing/2014/main" id="{EC323391-294B-4D3F-A2AB-EDE24C72573B}"/>
+              </a:ext>
+            </a:extLst>
+          </p:cNvPr>
+          <p:cNvSpPr>
+            <a:spLocks noGrp="1"/>
+          </p:cNvSpPr>
+          <p:nvPr>
+            <p:ph type="title"/>
+          </p:nvPr>
+        </p:nvSpPr>
+        <p:spPr/>
+        <p:txBody>
+          <a:bodyPr/>
+          <a:lstStyle/>
+          <a:p>
+            <a:r>
+              <a:rPr lang="en-US" dirty="0"/>
+              <a:t>Objective 2 – predict using ….</a:t>
+            </a:r>
+          </a:p>
+        </p:txBody>
+      </p:sp>
+      <p:sp>
+        <p:nvSpPr>
+          <p:cNvPr id="3" name="Content Placeholder 2">
+            <a:extLst>
+              <a:ext uri="{FF2B5EF4-FFF2-40B4-BE49-F238E27FC236}">
+                <a16:creationId xmlns:a16="http://schemas.microsoft.com/office/drawing/2014/main" id="{0BECCC59-21B5-4F53-B3F3-03B475260E11}"/>
+              </a:ext>
+            </a:extLst>
+          </p:cNvPr>
+          <p:cNvSpPr>
+            <a:spLocks noGrp="1"/>
+          </p:cNvSpPr>
+          <p:nvPr>
+            <p:ph idx="1"/>
+          </p:nvPr>
+        </p:nvSpPr>
+        <p:spPr/>
+        <p:txBody>
+          <a:bodyPr/>
+          <a:lstStyle/>
+          <a:p>
+            <a:r>
+              <a:rPr lang="en-US" dirty="0"/>
+              <a:t>Model Based Collaborative filtering</a:t>
+            </a:r>
+          </a:p>
+          <a:p>
+            <a:pPr lvl="1"/>
+            <a:r>
+              <a:rPr lang="en-US" dirty="0"/>
+              <a:t>SVD – singular value decomposition</a:t>
+            </a:r>
+          </a:p>
+          <a:p>
+            <a:pPr lvl="1"/>
+            <a:r>
+              <a:rPr lang="en-US" dirty="0"/>
+              <a:t>Recommends based on latent features of item-user matrices</a:t>
+            </a:r>
+          </a:p>
+          <a:p>
+            <a:pPr lvl="1"/>
+            <a:r>
+              <a:rPr lang="en-US" dirty="0"/>
+              <a:t>Provides rating prediction for given user</a:t>
+            </a:r>
+          </a:p>
+          <a:p>
+            <a:pPr lvl="1"/>
+            <a:endParaRPr lang="en-US" dirty="0"/>
+          </a:p>
+        </p:txBody>
+      </p:sp>
+    </p:spTree>
+    <p:extLst>
+      <p:ext uri="{BB962C8B-B14F-4D97-AF65-F5344CB8AC3E}">
+        <p14:creationId xmlns:p14="http://schemas.microsoft.com/office/powerpoint/2010/main" val="1945820125"/>
+      </p:ext>
+    </p:extLst>
+  </p:cSld>
+  <p:clrMapOvr>
+    <a:masterClrMapping/>
+  </p:clrMapOvr>
+</p:sld>
+</file>
+
+<file path=ppt/slides/slide9.xml><?xml version="1.0" encoding="utf-8"?>
+<p:sld xmlns:a="http://schemas.openxmlformats.org/drawingml/2006/main" xmlns:r="http://schemas.openxmlformats.org/officeDocument/2006/relationships" xmlns:p="http://schemas.openxmlformats.org/presentationml/2006/main">
+  <p:cSld>
+    <p:spTree>
+      <p:nvGrpSpPr>
+        <p:cNvPr id="1" name=""/>
+        <p:cNvGrpSpPr/>
+        <p:nvPr/>
+      </p:nvGrpSpPr>
+      <p:grpSpPr>
+        <a:xfrm>
+          <a:off x="0" y="0"/>
+          <a:ext cx="0" cy="0"/>
+          <a:chOff x="0" y="0"/>
+          <a:chExt cx="0" cy="0"/>
+        </a:xfrm>
+      </p:grpSpPr>
+      <p:sp>
+        <p:nvSpPr>
+          <p:cNvPr id="2" name="Title 1">
+            <a:extLst>
+              <a:ext uri="{FF2B5EF4-FFF2-40B4-BE49-F238E27FC236}">
+                <a16:creationId xmlns:a16="http://schemas.microsoft.com/office/drawing/2014/main" id="{BC01F367-4FAC-4606-821B-F225EB50AF43}"/>
+              </a:ext>
+            </a:extLst>
+          </p:cNvPr>
+          <p:cNvSpPr>
+            <a:spLocks noGrp="1"/>
+          </p:cNvSpPr>
+          <p:nvPr>
+            <p:ph type="title"/>
+          </p:nvPr>
+        </p:nvSpPr>
+        <p:spPr/>
+        <p:txBody>
+          <a:bodyPr/>
+          <a:lstStyle/>
+          <a:p>
+            <a:r>
+              <a:rPr lang="en-US" dirty="0"/>
+              <a:t>Objective 2 – Conclusion</a:t>
+            </a:r>
+          </a:p>
+        </p:txBody>
+      </p:sp>
+      <p:sp>
+        <p:nvSpPr>
+          <p:cNvPr id="3" name="Content Placeholder 2">
+            <a:extLst>
+              <a:ext uri="{FF2B5EF4-FFF2-40B4-BE49-F238E27FC236}">
+                <a16:creationId xmlns:a16="http://schemas.microsoft.com/office/drawing/2014/main" id="{4768E18A-BE94-4DDF-AFD6-160D73EC2FE4}"/>
+              </a:ext>
+            </a:extLst>
+          </p:cNvPr>
+          <p:cNvSpPr>
+            <a:spLocks noGrp="1"/>
+          </p:cNvSpPr>
+          <p:nvPr>
+            <p:ph idx="1"/>
+          </p:nvPr>
+        </p:nvSpPr>
+        <p:spPr/>
+        <p:txBody>
+          <a:bodyPr/>
+          <a:lstStyle/>
+          <a:p>
+            <a:r>
+              <a:rPr lang="en-US"/>
+              <a:t>Evaluation</a:t>
+            </a:r>
+          </a:p>
+        </p:txBody>
+      </p:sp>
+    </p:spTree>
+    <p:extLst>
+      <p:ext uri="{BB962C8B-B14F-4D97-AF65-F5344CB8AC3E}">
+        <p14:creationId xmlns:p14="http://schemas.microsoft.com/office/powerpoint/2010/main" val="745880702"/>
       </p:ext>
     </p:extLst>
   </p:cSld>

</xml_diff>

<commit_message>
began adding results comparisons to presentation
</commit_message>
<xml_diff>
--- a/Data Mining Project.pptx
+++ b/Data Mining Project.pptx
@@ -9,13 +9,19 @@
     <p:sldId id="262" r:id="rId3"/>
     <p:sldId id="263" r:id="rId4"/>
     <p:sldId id="264" r:id="rId5"/>
-    <p:sldId id="265" r:id="rId6"/>
-    <p:sldId id="257" r:id="rId7"/>
-    <p:sldId id="266" r:id="rId8"/>
-    <p:sldId id="258" r:id="rId9"/>
-    <p:sldId id="259" r:id="rId10"/>
-    <p:sldId id="260" r:id="rId11"/>
-    <p:sldId id="261" r:id="rId12"/>
+    <p:sldId id="267" r:id="rId6"/>
+    <p:sldId id="268" r:id="rId7"/>
+    <p:sldId id="265" r:id="rId8"/>
+    <p:sldId id="257" r:id="rId9"/>
+    <p:sldId id="269" r:id="rId10"/>
+    <p:sldId id="266" r:id="rId11"/>
+    <p:sldId id="258" r:id="rId12"/>
+    <p:sldId id="259" r:id="rId13"/>
+    <p:sldId id="270" r:id="rId14"/>
+    <p:sldId id="271" r:id="rId15"/>
+    <p:sldId id="272" r:id="rId16"/>
+    <p:sldId id="260" r:id="rId17"/>
+    <p:sldId id="261" r:id="rId18"/>
   </p:sldIdLst>
   <p:sldSz cx="12192000" cy="6858000"/>
   <p:notesSz cx="6858000" cy="9144000"/>
@@ -125,7 +131,7 @@
 <file path=ppt/revisionInfo.xml><?xml version="1.0" encoding="utf-8"?>
 <p1510:revInfo xmlns:a="http://schemas.openxmlformats.org/drawingml/2006/main" xmlns:r="http://schemas.openxmlformats.org/officeDocument/2006/relationships" xmlns:p1510="http://schemas.microsoft.com/office/powerpoint/2015/10/main">
   <p1510:revLst>
-    <p1510:client id="{18686A97-791D-43AD-ABBC-545FE93A2998}" v="6" dt="2021-03-31T00:36:34.674"/>
+    <p1510:client id="{18686A97-791D-43AD-ABBC-545FE93A2998}" v="17" dt="2021-04-02T00:58:14.001"/>
   </p1510:revLst>
 </p1510:revInfo>
 </file>
@@ -135,32 +141,104 @@
   <pc:docChgLst>
     <pc:chgData name="Russo, Dominick" userId="ac913056-28be-481e-bd9b-a61f757ee110" providerId="ADAL" clId="{18686A97-791D-43AD-ABBC-545FE93A2998}"/>
     <pc:docChg chg="undo custSel addSld modSld">
-      <pc:chgData name="Russo, Dominick" userId="ac913056-28be-481e-bd9b-a61f757ee110" providerId="ADAL" clId="{18686A97-791D-43AD-ABBC-545FE93A2998}" dt="2021-04-01T00:15:16.601" v="748" actId="20577"/>
+      <pc:chgData name="Russo, Dominick" userId="ac913056-28be-481e-bd9b-a61f757ee110" providerId="ADAL" clId="{18686A97-791D-43AD-ABBC-545FE93A2998}" dt="2021-04-02T01:08:02.111" v="3688" actId="20577"/>
       <pc:docMkLst>
         <pc:docMk/>
       </pc:docMkLst>
-      <pc:sldChg chg="modSp mod">
-        <pc:chgData name="Russo, Dominick" userId="ac913056-28be-481e-bd9b-a61f757ee110" providerId="ADAL" clId="{18686A97-791D-43AD-ABBC-545FE93A2998}" dt="2021-04-01T00:14:22.892" v="661" actId="20577"/>
+      <pc:sldChg chg="addSp delSp modSp mod modClrScheme chgLayout">
+        <pc:chgData name="Russo, Dominick" userId="ac913056-28be-481e-bd9b-a61f757ee110" providerId="ADAL" clId="{18686A97-791D-43AD-ABBC-545FE93A2998}" dt="2021-04-02T01:02:35.794" v="3539" actId="1076"/>
         <pc:sldMkLst>
           <pc:docMk/>
           <pc:sldMk cId="3561893636" sldId="257"/>
         </pc:sldMkLst>
-        <pc:spChg chg="mod">
-          <ac:chgData name="Russo, Dominick" userId="ac913056-28be-481e-bd9b-a61f757ee110" providerId="ADAL" clId="{18686A97-791D-43AD-ABBC-545FE93A2998}" dt="2021-04-01T00:14:22.892" v="661" actId="20577"/>
+        <pc:spChg chg="mod ord">
+          <ac:chgData name="Russo, Dominick" userId="ac913056-28be-481e-bd9b-a61f757ee110" providerId="ADAL" clId="{18686A97-791D-43AD-ABBC-545FE93A2998}" dt="2021-04-02T00:55:16.669" v="3481" actId="700"/>
           <ac:spMkLst>
             <pc:docMk/>
             <pc:sldMk cId="3561893636" sldId="257"/>
             <ac:spMk id="2" creationId="{D53BA0B7-F362-4798-876E-235EACCF04B2}"/>
           </ac:spMkLst>
         </pc:spChg>
-        <pc:spChg chg="mod">
-          <ac:chgData name="Russo, Dominick" userId="ac913056-28be-481e-bd9b-a61f757ee110" providerId="ADAL" clId="{18686A97-791D-43AD-ABBC-545FE93A2998}" dt="2021-03-31T00:32:16.670" v="90" actId="20577"/>
+        <pc:spChg chg="del mod ord">
+          <ac:chgData name="Russo, Dominick" userId="ac913056-28be-481e-bd9b-a61f757ee110" providerId="ADAL" clId="{18686A97-791D-43AD-ABBC-545FE93A2998}" dt="2021-04-02T00:55:16.669" v="3481" actId="700"/>
           <ac:spMkLst>
             <pc:docMk/>
             <pc:sldMk cId="3561893636" sldId="257"/>
             <ac:spMk id="3" creationId="{32E458F6-BE0F-4CD6-ABF2-F5FD97FF8FFC}"/>
           </ac:spMkLst>
         </pc:spChg>
+        <pc:spChg chg="add mod ord">
+          <ac:chgData name="Russo, Dominick" userId="ac913056-28be-481e-bd9b-a61f757ee110" providerId="ADAL" clId="{18686A97-791D-43AD-ABBC-545FE93A2998}" dt="2021-04-02T00:55:24.267" v="3493" actId="20577"/>
+          <ac:spMkLst>
+            <pc:docMk/>
+            <pc:sldMk cId="3561893636" sldId="257"/>
+            <ac:spMk id="4" creationId="{3B70AEEC-D3C8-473B-BB32-C808DED825D2}"/>
+          </ac:spMkLst>
+        </pc:spChg>
+        <pc:spChg chg="add del mod ord">
+          <ac:chgData name="Russo, Dominick" userId="ac913056-28be-481e-bd9b-a61f757ee110" providerId="ADAL" clId="{18686A97-791D-43AD-ABBC-545FE93A2998}" dt="2021-04-02T01:00:40.652" v="3528" actId="22"/>
+          <ac:spMkLst>
+            <pc:docMk/>
+            <pc:sldMk cId="3561893636" sldId="257"/>
+            <ac:spMk id="5" creationId="{9BC55340-A728-457A-87B8-F258511CC39A}"/>
+          </ac:spMkLst>
+        </pc:spChg>
+        <pc:spChg chg="add mod ord">
+          <ac:chgData name="Russo, Dominick" userId="ac913056-28be-481e-bd9b-a61f757ee110" providerId="ADAL" clId="{18686A97-791D-43AD-ABBC-545FE93A2998}" dt="2021-04-02T00:55:28.616" v="3504" actId="20577"/>
+          <ac:spMkLst>
+            <pc:docMk/>
+            <pc:sldMk cId="3561893636" sldId="257"/>
+            <ac:spMk id="6" creationId="{C2BD5F8F-635E-4BB2-9F7E-49FADAC9294A}"/>
+          </ac:spMkLst>
+        </pc:spChg>
+        <pc:spChg chg="add del mod ord">
+          <ac:chgData name="Russo, Dominick" userId="ac913056-28be-481e-bd9b-a61f757ee110" providerId="ADAL" clId="{18686A97-791D-43AD-ABBC-545FE93A2998}" dt="2021-04-02T01:01:31.942" v="3532" actId="22"/>
+          <ac:spMkLst>
+            <pc:docMk/>
+            <pc:sldMk cId="3561893636" sldId="257"/>
+            <ac:spMk id="7" creationId="{3E046EFD-3227-45F4-AFCA-681706BC10FD}"/>
+          </ac:spMkLst>
+        </pc:spChg>
+        <pc:spChg chg="add mod">
+          <ac:chgData name="Russo, Dominick" userId="ac913056-28be-481e-bd9b-a61f757ee110" providerId="ADAL" clId="{18686A97-791D-43AD-ABBC-545FE93A2998}" dt="2021-04-02T00:58:22.833" v="3514" actId="5793"/>
+          <ac:spMkLst>
+            <pc:docMk/>
+            <pc:sldMk cId="3561893636" sldId="257"/>
+            <ac:spMk id="8" creationId="{F710921E-18D1-407C-82C0-1D3FD39218D3}"/>
+          </ac:spMkLst>
+        </pc:spChg>
+        <pc:picChg chg="add mod">
+          <ac:chgData name="Russo, Dominick" userId="ac913056-28be-481e-bd9b-a61f757ee110" providerId="ADAL" clId="{18686A97-791D-43AD-ABBC-545FE93A2998}" dt="2021-04-02T01:02:35.794" v="3539" actId="1076"/>
+          <ac:picMkLst>
+            <pc:docMk/>
+            <pc:sldMk cId="3561893636" sldId="257"/>
+            <ac:picMk id="10" creationId="{E4860A78-64DD-4E4A-8273-4B6A0FC66D93}"/>
+          </ac:picMkLst>
+        </pc:picChg>
+        <pc:picChg chg="add mod ord">
+          <ac:chgData name="Russo, Dominick" userId="ac913056-28be-481e-bd9b-a61f757ee110" providerId="ADAL" clId="{18686A97-791D-43AD-ABBC-545FE93A2998}" dt="2021-04-02T01:00:40.652" v="3528" actId="22"/>
+          <ac:picMkLst>
+            <pc:docMk/>
+            <pc:sldMk cId="3561893636" sldId="257"/>
+            <ac:picMk id="12" creationId="{F09D7F65-1B1D-4F8B-8879-66DA5F8B8A74}"/>
+          </ac:picMkLst>
+        </pc:picChg>
+        <pc:picChg chg="add mod ord">
+          <ac:chgData name="Russo, Dominick" userId="ac913056-28be-481e-bd9b-a61f757ee110" providerId="ADAL" clId="{18686A97-791D-43AD-ABBC-545FE93A2998}" dt="2021-04-02T01:01:40.835" v="3533" actId="1076"/>
+          <ac:picMkLst>
+            <pc:docMk/>
+            <pc:sldMk cId="3561893636" sldId="257"/>
+            <ac:picMk id="14" creationId="{1FBD36CB-C59E-4F34-ABED-84E475101C51}"/>
+          </ac:picMkLst>
+        </pc:picChg>
+        <pc:picChg chg="add mod">
+          <ac:chgData name="Russo, Dominick" userId="ac913056-28be-481e-bd9b-a61f757ee110" providerId="ADAL" clId="{18686A97-791D-43AD-ABBC-545FE93A2998}" dt="2021-04-02T01:02:29.897" v="3538" actId="1076"/>
+          <ac:picMkLst>
+            <pc:docMk/>
+            <pc:sldMk cId="3561893636" sldId="257"/>
+            <ac:picMk id="16" creationId="{A507E991-8A38-47D8-9498-0DEE248BE9A3}"/>
+          </ac:picMkLst>
+        </pc:picChg>
       </pc:sldChg>
       <pc:sldChg chg="modSp mod">
         <pc:chgData name="Russo, Dominick" userId="ac913056-28be-481e-bd9b-a61f757ee110" providerId="ADAL" clId="{18686A97-791D-43AD-ABBC-545FE93A2998}" dt="2021-04-01T00:14:13.053" v="625" actId="20577"/>
@@ -209,6 +287,29 @@
         </pc:spChg>
       </pc:sldChg>
       <pc:sldChg chg="modSp mod">
+        <pc:chgData name="Russo, Dominick" userId="ac913056-28be-481e-bd9b-a61f757ee110" providerId="ADAL" clId="{18686A97-791D-43AD-ABBC-545FE93A2998}" dt="2021-04-02T00:04:14.592" v="2771"/>
+        <pc:sldMkLst>
+          <pc:docMk/>
+          <pc:sldMk cId="3581822688" sldId="260"/>
+        </pc:sldMkLst>
+        <pc:spChg chg="mod">
+          <ac:chgData name="Russo, Dominick" userId="ac913056-28be-481e-bd9b-a61f757ee110" providerId="ADAL" clId="{18686A97-791D-43AD-ABBC-545FE93A2998}" dt="2021-04-01T23:06:33.007" v="1449" actId="20577"/>
+          <ac:spMkLst>
+            <pc:docMk/>
+            <pc:sldMk cId="3581822688" sldId="260"/>
+            <ac:spMk id="2" creationId="{4E218467-2286-44AF-BF77-2BFAAF380B10}"/>
+          </ac:spMkLst>
+        </pc:spChg>
+        <pc:spChg chg="mod">
+          <ac:chgData name="Russo, Dominick" userId="ac913056-28be-481e-bd9b-a61f757ee110" providerId="ADAL" clId="{18686A97-791D-43AD-ABBC-545FE93A2998}" dt="2021-04-02T00:04:14.592" v="2771"/>
+          <ac:spMkLst>
+            <pc:docMk/>
+            <pc:sldMk cId="3581822688" sldId="260"/>
+            <ac:spMk id="3" creationId="{40C2538A-6C5E-4FD7-8C94-7FF0951CE09A}"/>
+          </ac:spMkLst>
+        </pc:spChg>
+      </pc:sldChg>
+      <pc:sldChg chg="modSp mod">
         <pc:chgData name="Russo, Dominick" userId="ac913056-28be-481e-bd9b-a61f757ee110" providerId="ADAL" clId="{18686A97-791D-43AD-ABBC-545FE93A2998}" dt="2021-03-31T00:36:34.689" v="271" actId="27636"/>
         <pc:sldMkLst>
           <pc:docMk/>
@@ -246,8 +347,8 @@
           </ac:spMkLst>
         </pc:spChg>
       </pc:sldChg>
-      <pc:sldChg chg="modSp new mod">
-        <pc:chgData name="Russo, Dominick" userId="ac913056-28be-481e-bd9b-a61f757ee110" providerId="ADAL" clId="{18686A97-791D-43AD-ABBC-545FE93A2998}" dt="2021-04-01T00:13:45.399" v="589" actId="20577"/>
+      <pc:sldChg chg="modSp new mod modShow">
+        <pc:chgData name="Russo, Dominick" userId="ac913056-28be-481e-bd9b-a61f757ee110" providerId="ADAL" clId="{18686A97-791D-43AD-ABBC-545FE93A2998}" dt="2021-04-01T20:36:02.604" v="1096" actId="729"/>
         <pc:sldMkLst>
           <pc:docMk/>
           <pc:sldMk cId="372263730" sldId="263"/>
@@ -270,7 +371,7 @@
         </pc:spChg>
       </pc:sldChg>
       <pc:sldChg chg="modSp new mod">
-        <pc:chgData name="Russo, Dominick" userId="ac913056-28be-481e-bd9b-a61f757ee110" providerId="ADAL" clId="{18686A97-791D-43AD-ABBC-545FE93A2998}" dt="2021-04-01T00:12:34.856" v="454" actId="20577"/>
+        <pc:chgData name="Russo, Dominick" userId="ac913056-28be-481e-bd9b-a61f757ee110" providerId="ADAL" clId="{18686A97-791D-43AD-ABBC-545FE93A2998}" dt="2021-04-02T00:16:13.743" v="3435" actId="313"/>
         <pc:sldMkLst>
           <pc:docMk/>
           <pc:sldMk cId="3069617171" sldId="264"/>
@@ -284,7 +385,7 @@
           </ac:spMkLst>
         </pc:spChg>
         <pc:spChg chg="mod">
-          <ac:chgData name="Russo, Dominick" userId="ac913056-28be-481e-bd9b-a61f757ee110" providerId="ADAL" clId="{18686A97-791D-43AD-ABBC-545FE93A2998}" dt="2021-04-01T00:12:34.856" v="454" actId="20577"/>
+          <ac:chgData name="Russo, Dominick" userId="ac913056-28be-481e-bd9b-a61f757ee110" providerId="ADAL" clId="{18686A97-791D-43AD-ABBC-545FE93A2998}" dt="2021-04-02T00:16:13.743" v="3435" actId="313"/>
           <ac:spMkLst>
             <pc:docMk/>
             <pc:sldMk cId="3069617171" sldId="264"/>
@@ -293,13 +394,13 @@
         </pc:spChg>
       </pc:sldChg>
       <pc:sldChg chg="modSp new mod">
-        <pc:chgData name="Russo, Dominick" userId="ac913056-28be-481e-bd9b-a61f757ee110" providerId="ADAL" clId="{18686A97-791D-43AD-ABBC-545FE93A2998}" dt="2021-04-01T00:13:31.117" v="569" actId="313"/>
+        <pc:chgData name="Russo, Dominick" userId="ac913056-28be-481e-bd9b-a61f757ee110" providerId="ADAL" clId="{18686A97-791D-43AD-ABBC-545FE93A2998}" dt="2021-04-01T20:42:37.261" v="1362" actId="20577"/>
         <pc:sldMkLst>
           <pc:docMk/>
           <pc:sldMk cId="3843785652" sldId="265"/>
         </pc:sldMkLst>
         <pc:spChg chg="mod">
-          <ac:chgData name="Russo, Dominick" userId="ac913056-28be-481e-bd9b-a61f757ee110" providerId="ADAL" clId="{18686A97-791D-43AD-ABBC-545FE93A2998}" dt="2021-04-01T00:12:46.566" v="471" actId="20577"/>
+          <ac:chgData name="Russo, Dominick" userId="ac913056-28be-481e-bd9b-a61f757ee110" providerId="ADAL" clId="{18686A97-791D-43AD-ABBC-545FE93A2998}" dt="2021-04-01T20:36:32.878" v="1098" actId="20577"/>
           <ac:spMkLst>
             <pc:docMk/>
             <pc:sldMk cId="3843785652" sldId="265"/>
@@ -307,7 +408,7 @@
           </ac:spMkLst>
         </pc:spChg>
         <pc:spChg chg="mod">
-          <ac:chgData name="Russo, Dominick" userId="ac913056-28be-481e-bd9b-a61f757ee110" providerId="ADAL" clId="{18686A97-791D-43AD-ABBC-545FE93A2998}" dt="2021-04-01T00:13:31.117" v="569" actId="313"/>
+          <ac:chgData name="Russo, Dominick" userId="ac913056-28be-481e-bd9b-a61f757ee110" providerId="ADAL" clId="{18686A97-791D-43AD-ABBC-545FE93A2998}" dt="2021-04-01T20:42:37.261" v="1362" actId="20577"/>
           <ac:spMkLst>
             <pc:docMk/>
             <pc:sldMk cId="3843785652" sldId="265"/>
@@ -316,7 +417,7 @@
         </pc:spChg>
       </pc:sldChg>
       <pc:sldChg chg="modSp new mod">
-        <pc:chgData name="Russo, Dominick" userId="ac913056-28be-481e-bd9b-a61f757ee110" providerId="ADAL" clId="{18686A97-791D-43AD-ABBC-545FE93A2998}" dt="2021-04-01T00:14:55.004" v="707" actId="20577"/>
+        <pc:chgData name="Russo, Dominick" userId="ac913056-28be-481e-bd9b-a61f757ee110" providerId="ADAL" clId="{18686A97-791D-43AD-ABBC-545FE93A2998}" dt="2021-04-02T01:07:22.936" v="3623" actId="20577"/>
         <pc:sldMkLst>
           <pc:docMk/>
           <pc:sldMk cId="3757042173" sldId="266"/>
@@ -330,11 +431,205 @@
           </ac:spMkLst>
         </pc:spChg>
         <pc:spChg chg="mod">
-          <ac:chgData name="Russo, Dominick" userId="ac913056-28be-481e-bd9b-a61f757ee110" providerId="ADAL" clId="{18686A97-791D-43AD-ABBC-545FE93A2998}" dt="2021-04-01T00:14:55.004" v="707" actId="20577"/>
+          <ac:chgData name="Russo, Dominick" userId="ac913056-28be-481e-bd9b-a61f757ee110" providerId="ADAL" clId="{18686A97-791D-43AD-ABBC-545FE93A2998}" dt="2021-04-02T01:07:22.936" v="3623" actId="20577"/>
           <ac:spMkLst>
             <pc:docMk/>
             <pc:sldMk cId="3757042173" sldId="266"/>
             <ac:spMk id="3" creationId="{0F6B2AA9-9B12-47CD-82EE-906D0F04B888}"/>
+          </ac:spMkLst>
+        </pc:spChg>
+      </pc:sldChg>
+      <pc:sldChg chg="addSp delSp modSp new mod">
+        <pc:chgData name="Russo, Dominick" userId="ac913056-28be-481e-bd9b-a61f757ee110" providerId="ADAL" clId="{18686A97-791D-43AD-ABBC-545FE93A2998}" dt="2021-04-01T23:27:21.171" v="2067" actId="20577"/>
+        <pc:sldMkLst>
+          <pc:docMk/>
+          <pc:sldMk cId="3003676372" sldId="267"/>
+        </pc:sldMkLst>
+        <pc:spChg chg="mod">
+          <ac:chgData name="Russo, Dominick" userId="ac913056-28be-481e-bd9b-a61f757ee110" providerId="ADAL" clId="{18686A97-791D-43AD-ABBC-545FE93A2998}" dt="2021-04-01T20:43:17.522" v="1390" actId="313"/>
+          <ac:spMkLst>
+            <pc:docMk/>
+            <pc:sldMk cId="3003676372" sldId="267"/>
+            <ac:spMk id="2" creationId="{CFEB6D4F-B155-4F48-8616-061875839A1D}"/>
+          </ac:spMkLst>
+        </pc:spChg>
+        <pc:spChg chg="mod">
+          <ac:chgData name="Russo, Dominick" userId="ac913056-28be-481e-bd9b-a61f757ee110" providerId="ADAL" clId="{18686A97-791D-43AD-ABBC-545FE93A2998}" dt="2021-04-01T23:27:21.171" v="2067" actId="20577"/>
+          <ac:spMkLst>
+            <pc:docMk/>
+            <pc:sldMk cId="3003676372" sldId="267"/>
+            <ac:spMk id="3" creationId="{26BC24FC-BA35-4EF9-8D94-F597C7317257}"/>
+          </ac:spMkLst>
+        </pc:spChg>
+        <pc:spChg chg="add del mod">
+          <ac:chgData name="Russo, Dominick" userId="ac913056-28be-481e-bd9b-a61f757ee110" providerId="ADAL" clId="{18686A97-791D-43AD-ABBC-545FE93A2998}" dt="2021-04-01T23:20:18.167" v="1838"/>
+          <ac:spMkLst>
+            <pc:docMk/>
+            <pc:sldMk cId="3003676372" sldId="267"/>
+            <ac:spMk id="4" creationId="{9E5AB7AA-A6B7-4AF3-88A1-EA4752DE77E9}"/>
+          </ac:spMkLst>
+        </pc:spChg>
+        <pc:spChg chg="add mod">
+          <ac:chgData name="Russo, Dominick" userId="ac913056-28be-481e-bd9b-a61f757ee110" providerId="ADAL" clId="{18686A97-791D-43AD-ABBC-545FE93A2998}" dt="2021-04-01T23:21:10.055" v="1866" actId="1076"/>
+          <ac:spMkLst>
+            <pc:docMk/>
+            <pc:sldMk cId="3003676372" sldId="267"/>
+            <ac:spMk id="5" creationId="{CEFDE8C6-C98D-488A-8EBF-B3DC2E116270}"/>
+          </ac:spMkLst>
+        </pc:spChg>
+      </pc:sldChg>
+      <pc:sldChg chg="addSp modSp new mod">
+        <pc:chgData name="Russo, Dominick" userId="ac913056-28be-481e-bd9b-a61f757ee110" providerId="ADAL" clId="{18686A97-791D-43AD-ABBC-545FE93A2998}" dt="2021-04-02T00:17:40.043" v="3436" actId="20577"/>
+        <pc:sldMkLst>
+          <pc:docMk/>
+          <pc:sldMk cId="3109651658" sldId="268"/>
+        </pc:sldMkLst>
+        <pc:spChg chg="mod">
+          <ac:chgData name="Russo, Dominick" userId="ac913056-28be-481e-bd9b-a61f757ee110" providerId="ADAL" clId="{18686A97-791D-43AD-ABBC-545FE93A2998}" dt="2021-04-01T23:42:58.522" v="2162" actId="20577"/>
+          <ac:spMkLst>
+            <pc:docMk/>
+            <pc:sldMk cId="3109651658" sldId="268"/>
+            <ac:spMk id="2" creationId="{2F870888-3F1A-4ED6-A4BA-64282290105D}"/>
+          </ac:spMkLst>
+        </pc:spChg>
+        <pc:spChg chg="mod">
+          <ac:chgData name="Russo, Dominick" userId="ac913056-28be-481e-bd9b-a61f757ee110" providerId="ADAL" clId="{18686A97-791D-43AD-ABBC-545FE93A2998}" dt="2021-04-02T00:17:40.043" v="3436" actId="20577"/>
+          <ac:spMkLst>
+            <pc:docMk/>
+            <pc:sldMk cId="3109651658" sldId="268"/>
+            <ac:spMk id="3" creationId="{69FFE559-3241-4F58-B2F5-9D5441E71AC8}"/>
+          </ac:spMkLst>
+        </pc:spChg>
+        <pc:spChg chg="add mod">
+          <ac:chgData name="Russo, Dominick" userId="ac913056-28be-481e-bd9b-a61f757ee110" providerId="ADAL" clId="{18686A97-791D-43AD-ABBC-545FE93A2998}" dt="2021-04-02T00:05:00.800" v="2791" actId="20577"/>
+          <ac:spMkLst>
+            <pc:docMk/>
+            <pc:sldMk cId="3109651658" sldId="268"/>
+            <ac:spMk id="4" creationId="{6A2134F3-D30D-4E6A-9926-3BDE35C8BCBD}"/>
+          </ac:spMkLst>
+        </pc:spChg>
+      </pc:sldChg>
+      <pc:sldChg chg="addSp delSp modSp add mod">
+        <pc:chgData name="Russo, Dominick" userId="ac913056-28be-481e-bd9b-a61f757ee110" providerId="ADAL" clId="{18686A97-791D-43AD-ABBC-545FE93A2998}" dt="2021-04-02T01:06:13.511" v="3586" actId="1076"/>
+        <pc:sldMkLst>
+          <pc:docMk/>
+          <pc:sldMk cId="10790581" sldId="269"/>
+        </pc:sldMkLst>
+        <pc:spChg chg="mod">
+          <ac:chgData name="Russo, Dominick" userId="ac913056-28be-481e-bd9b-a61f757ee110" providerId="ADAL" clId="{18686A97-791D-43AD-ABBC-545FE93A2998}" dt="2021-04-02T01:05:20.371" v="3579" actId="1076"/>
+          <ac:spMkLst>
+            <pc:docMk/>
+            <pc:sldMk cId="10790581" sldId="269"/>
+            <ac:spMk id="4" creationId="{3B70AEEC-D3C8-473B-BB32-C808DED825D2}"/>
+          </ac:spMkLst>
+        </pc:spChg>
+        <pc:spChg chg="mod">
+          <ac:chgData name="Russo, Dominick" userId="ac913056-28be-481e-bd9b-a61f757ee110" providerId="ADAL" clId="{18686A97-791D-43AD-ABBC-545FE93A2998}" dt="2021-04-02T01:04:07.514" v="3569" actId="20577"/>
+          <ac:spMkLst>
+            <pc:docMk/>
+            <pc:sldMk cId="10790581" sldId="269"/>
+            <ac:spMk id="6" creationId="{C2BD5F8F-635E-4BB2-9F7E-49FADAC9294A}"/>
+          </ac:spMkLst>
+        </pc:spChg>
+        <pc:spChg chg="add del mod">
+          <ac:chgData name="Russo, Dominick" userId="ac913056-28be-481e-bd9b-a61f757ee110" providerId="ADAL" clId="{18686A97-791D-43AD-ABBC-545FE93A2998}" dt="2021-04-02T01:04:53.676" v="3574" actId="478"/>
+          <ac:spMkLst>
+            <pc:docMk/>
+            <pc:sldMk cId="10790581" sldId="269"/>
+            <ac:spMk id="9" creationId="{ED045C92-76A0-4FCA-A1F0-142FE2F059A7}"/>
+          </ac:spMkLst>
+        </pc:spChg>
+        <pc:picChg chg="add mod">
+          <ac:chgData name="Russo, Dominick" userId="ac913056-28be-481e-bd9b-a61f757ee110" providerId="ADAL" clId="{18686A97-791D-43AD-ABBC-545FE93A2998}" dt="2021-04-02T01:05:07.257" v="3578" actId="1076"/>
+          <ac:picMkLst>
+            <pc:docMk/>
+            <pc:sldMk cId="10790581" sldId="269"/>
+            <ac:picMk id="5" creationId="{80C80142-628F-4DE8-8905-E0A22C45F91C}"/>
+          </ac:picMkLst>
+        </pc:picChg>
+        <pc:picChg chg="mod">
+          <ac:chgData name="Russo, Dominick" userId="ac913056-28be-481e-bd9b-a61f757ee110" providerId="ADAL" clId="{18686A97-791D-43AD-ABBC-545FE93A2998}" dt="2021-04-02T01:06:13.511" v="3586" actId="1076"/>
+          <ac:picMkLst>
+            <pc:docMk/>
+            <pc:sldMk cId="10790581" sldId="269"/>
+            <ac:picMk id="10" creationId="{E4860A78-64DD-4E4A-8273-4B6A0FC66D93}"/>
+          </ac:picMkLst>
+        </pc:picChg>
+        <pc:picChg chg="mod">
+          <ac:chgData name="Russo, Dominick" userId="ac913056-28be-481e-bd9b-a61f757ee110" providerId="ADAL" clId="{18686A97-791D-43AD-ABBC-545FE93A2998}" dt="2021-04-02T01:05:20.371" v="3579" actId="1076"/>
+          <ac:picMkLst>
+            <pc:docMk/>
+            <pc:sldMk cId="10790581" sldId="269"/>
+            <ac:picMk id="12" creationId="{F09D7F65-1B1D-4F8B-8879-66DA5F8B8A74}"/>
+          </ac:picMkLst>
+        </pc:picChg>
+        <pc:picChg chg="add mod">
+          <ac:chgData name="Russo, Dominick" userId="ac913056-28be-481e-bd9b-a61f757ee110" providerId="ADAL" clId="{18686A97-791D-43AD-ABBC-545FE93A2998}" dt="2021-04-02T01:06:08.592" v="3585" actId="1076"/>
+          <ac:picMkLst>
+            <pc:docMk/>
+            <pc:sldMk cId="10790581" sldId="269"/>
+            <ac:picMk id="13" creationId="{BFEC8A03-A882-48BF-A6E0-8F89E26257E1}"/>
+          </ac:picMkLst>
+        </pc:picChg>
+        <pc:picChg chg="del">
+          <ac:chgData name="Russo, Dominick" userId="ac913056-28be-481e-bd9b-a61f757ee110" providerId="ADAL" clId="{18686A97-791D-43AD-ABBC-545FE93A2998}" dt="2021-04-02T01:04:50.205" v="3573" actId="478"/>
+          <ac:picMkLst>
+            <pc:docMk/>
+            <pc:sldMk cId="10790581" sldId="269"/>
+            <ac:picMk id="14" creationId="{1FBD36CB-C59E-4F34-ABED-84E475101C51}"/>
+          </ac:picMkLst>
+        </pc:picChg>
+        <pc:picChg chg="del mod">
+          <ac:chgData name="Russo, Dominick" userId="ac913056-28be-481e-bd9b-a61f757ee110" providerId="ADAL" clId="{18686A97-791D-43AD-ABBC-545FE93A2998}" dt="2021-04-02T01:05:24.893" v="3580" actId="478"/>
+          <ac:picMkLst>
+            <pc:docMk/>
+            <pc:sldMk cId="10790581" sldId="269"/>
+            <ac:picMk id="16" creationId="{A507E991-8A38-47D8-9498-0DEE248BE9A3}"/>
+          </ac:picMkLst>
+        </pc:picChg>
+      </pc:sldChg>
+      <pc:sldChg chg="modSp new mod">
+        <pc:chgData name="Russo, Dominick" userId="ac913056-28be-481e-bd9b-a61f757ee110" providerId="ADAL" clId="{18686A97-791D-43AD-ABBC-545FE93A2998}" dt="2021-04-02T01:07:40.918" v="3646" actId="20577"/>
+        <pc:sldMkLst>
+          <pc:docMk/>
+          <pc:sldMk cId="3418160618" sldId="270"/>
+        </pc:sldMkLst>
+        <pc:spChg chg="mod">
+          <ac:chgData name="Russo, Dominick" userId="ac913056-28be-481e-bd9b-a61f757ee110" providerId="ADAL" clId="{18686A97-791D-43AD-ABBC-545FE93A2998}" dt="2021-04-02T01:07:40.918" v="3646" actId="20577"/>
+          <ac:spMkLst>
+            <pc:docMk/>
+            <pc:sldMk cId="3418160618" sldId="270"/>
+            <ac:spMk id="2" creationId="{56AE5E81-7C66-442A-A2AC-A999A0C2DBFF}"/>
+          </ac:spMkLst>
+        </pc:spChg>
+      </pc:sldChg>
+      <pc:sldChg chg="modSp new mod">
+        <pc:chgData name="Russo, Dominick" userId="ac913056-28be-481e-bd9b-a61f757ee110" providerId="ADAL" clId="{18686A97-791D-43AD-ABBC-545FE93A2998}" dt="2021-04-02T01:07:49.810" v="3675" actId="20577"/>
+        <pc:sldMkLst>
+          <pc:docMk/>
+          <pc:sldMk cId="1223573897" sldId="271"/>
+        </pc:sldMkLst>
+        <pc:spChg chg="mod">
+          <ac:chgData name="Russo, Dominick" userId="ac913056-28be-481e-bd9b-a61f757ee110" providerId="ADAL" clId="{18686A97-791D-43AD-ABBC-545FE93A2998}" dt="2021-04-02T01:07:49.810" v="3675" actId="20577"/>
+          <ac:spMkLst>
+            <pc:docMk/>
+            <pc:sldMk cId="1223573897" sldId="271"/>
+            <ac:spMk id="2" creationId="{B51EBD61-4734-450B-B6AD-FDF8CEBDC4ED}"/>
+          </ac:spMkLst>
+        </pc:spChg>
+      </pc:sldChg>
+      <pc:sldChg chg="modSp new mod">
+        <pc:chgData name="Russo, Dominick" userId="ac913056-28be-481e-bd9b-a61f757ee110" providerId="ADAL" clId="{18686A97-791D-43AD-ABBC-545FE93A2998}" dt="2021-04-02T01:08:02.111" v="3688" actId="20577"/>
+        <pc:sldMkLst>
+          <pc:docMk/>
+          <pc:sldMk cId="1550210309" sldId="272"/>
+        </pc:sldMkLst>
+        <pc:spChg chg="mod">
+          <ac:chgData name="Russo, Dominick" userId="ac913056-28be-481e-bd9b-a61f757ee110" providerId="ADAL" clId="{18686A97-791D-43AD-ABBC-545FE93A2998}" dt="2021-04-02T01:08:02.111" v="3688" actId="20577"/>
+          <ac:spMkLst>
+            <pc:docMk/>
+            <pc:sldMk cId="1550210309" sldId="272"/>
+            <ac:spMk id="2" creationId="{D69591FC-F063-4A4D-9B2D-52953DFEEAFD}"/>
           </ac:spMkLst>
         </pc:spChg>
       </pc:sldChg>
@@ -490,7 +785,7 @@
           <a:p>
             <a:fld id="{F260A7E5-A30E-4E63-B175-1CF7A0DB8AB1}" type="datetimeFigureOut">
               <a:rPr lang="en-US" smtClean="0"/>
-              <a:t>3/31/2021</a:t>
+              <a:t>4/1/2021</a:t>
             </a:fld>
             <a:endParaRPr lang="en-US"/>
           </a:p>
@@ -688,7 +983,7 @@
           <a:p>
             <a:fld id="{F260A7E5-A30E-4E63-B175-1CF7A0DB8AB1}" type="datetimeFigureOut">
               <a:rPr lang="en-US" smtClean="0"/>
-              <a:t>3/31/2021</a:t>
+              <a:t>4/1/2021</a:t>
             </a:fld>
             <a:endParaRPr lang="en-US"/>
           </a:p>
@@ -896,7 +1191,7 @@
           <a:p>
             <a:fld id="{F260A7E5-A30E-4E63-B175-1CF7A0DB8AB1}" type="datetimeFigureOut">
               <a:rPr lang="en-US" smtClean="0"/>
-              <a:t>3/31/2021</a:t>
+              <a:t>4/1/2021</a:t>
             </a:fld>
             <a:endParaRPr lang="en-US"/>
           </a:p>
@@ -1094,7 +1389,7 @@
           <a:p>
             <a:fld id="{F260A7E5-A30E-4E63-B175-1CF7A0DB8AB1}" type="datetimeFigureOut">
               <a:rPr lang="en-US" smtClean="0"/>
-              <a:t>3/31/2021</a:t>
+              <a:t>4/1/2021</a:t>
             </a:fld>
             <a:endParaRPr lang="en-US"/>
           </a:p>
@@ -1369,7 +1664,7 @@
           <a:p>
             <a:fld id="{F260A7E5-A30E-4E63-B175-1CF7A0DB8AB1}" type="datetimeFigureOut">
               <a:rPr lang="en-US" smtClean="0"/>
-              <a:t>3/31/2021</a:t>
+              <a:t>4/1/2021</a:t>
             </a:fld>
             <a:endParaRPr lang="en-US"/>
           </a:p>
@@ -1634,7 +1929,7 @@
           <a:p>
             <a:fld id="{F260A7E5-A30E-4E63-B175-1CF7A0DB8AB1}" type="datetimeFigureOut">
               <a:rPr lang="en-US" smtClean="0"/>
-              <a:t>3/31/2021</a:t>
+              <a:t>4/1/2021</a:t>
             </a:fld>
             <a:endParaRPr lang="en-US"/>
           </a:p>
@@ -2046,7 +2341,7 @@
           <a:p>
             <a:fld id="{F260A7E5-A30E-4E63-B175-1CF7A0DB8AB1}" type="datetimeFigureOut">
               <a:rPr lang="en-US" smtClean="0"/>
-              <a:t>3/31/2021</a:t>
+              <a:t>4/1/2021</a:t>
             </a:fld>
             <a:endParaRPr lang="en-US"/>
           </a:p>
@@ -2187,7 +2482,7 @@
           <a:p>
             <a:fld id="{F260A7E5-A30E-4E63-B175-1CF7A0DB8AB1}" type="datetimeFigureOut">
               <a:rPr lang="en-US" smtClean="0"/>
-              <a:t>3/31/2021</a:t>
+              <a:t>4/1/2021</a:t>
             </a:fld>
             <a:endParaRPr lang="en-US"/>
           </a:p>
@@ -2300,7 +2595,7 @@
           <a:p>
             <a:fld id="{F260A7E5-A30E-4E63-B175-1CF7A0DB8AB1}" type="datetimeFigureOut">
               <a:rPr lang="en-US" smtClean="0"/>
-              <a:t>3/31/2021</a:t>
+              <a:t>4/1/2021</a:t>
             </a:fld>
             <a:endParaRPr lang="en-US"/>
           </a:p>
@@ -2611,7 +2906,7 @@
           <a:p>
             <a:fld id="{F260A7E5-A30E-4E63-B175-1CF7A0DB8AB1}" type="datetimeFigureOut">
               <a:rPr lang="en-US" smtClean="0"/>
-              <a:t>3/31/2021</a:t>
+              <a:t>4/1/2021</a:t>
             </a:fld>
             <a:endParaRPr lang="en-US"/>
           </a:p>
@@ -2899,7 +3194,7 @@
           <a:p>
             <a:fld id="{F260A7E5-A30E-4E63-B175-1CF7A0DB8AB1}" type="datetimeFigureOut">
               <a:rPr lang="en-US" smtClean="0"/>
-              <a:t>3/31/2021</a:t>
+              <a:t>4/1/2021</a:t>
             </a:fld>
             <a:endParaRPr lang="en-US"/>
           </a:p>
@@ -3140,7 +3435,7 @@
           <a:p>
             <a:fld id="{F260A7E5-A30E-4E63-B175-1CF7A0DB8AB1}" type="datetimeFigureOut">
               <a:rPr lang="en-US" smtClean="0"/>
-              <a:t>3/31/2021</a:t>
+              <a:t>4/1/2021</a:t>
             </a:fld>
             <a:endParaRPr lang="en-US"/>
           </a:p>
@@ -3645,7 +3940,7 @@
           <p:cNvPr id="2" name="Title 1">
             <a:extLst>
               <a:ext uri="{FF2B5EF4-FFF2-40B4-BE49-F238E27FC236}">
-                <a16:creationId xmlns:a16="http://schemas.microsoft.com/office/drawing/2014/main" id="{4E218467-2286-44AF-BF77-2BFAAF380B10}"/>
+                <a16:creationId xmlns:a16="http://schemas.microsoft.com/office/drawing/2014/main" id="{CA80252C-D5FB-4D19-9B3F-F12C2DC9F84C}"/>
               </a:ext>
             </a:extLst>
           </p:cNvPr>
@@ -3661,7 +3956,10 @@
           <a:bodyPr/>
           <a:lstStyle/>
           <a:p>
-            <a:endParaRPr lang="en-US"/>
+            <a:r>
+              <a:rPr lang="en-US" dirty="0"/>
+              <a:t>Objective 1 – Conclusion</a:t>
+            </a:r>
           </a:p>
         </p:txBody>
       </p:sp>
@@ -3670,7 +3968,7 @@
           <p:cNvPr id="3" name="Content Placeholder 2">
             <a:extLst>
               <a:ext uri="{FF2B5EF4-FFF2-40B4-BE49-F238E27FC236}">
-                <a16:creationId xmlns:a16="http://schemas.microsoft.com/office/drawing/2014/main" id="{40C2538A-6C5E-4FD7-8C94-7FF0951CE09A}"/>
+                <a16:creationId xmlns:a16="http://schemas.microsoft.com/office/drawing/2014/main" id="{0F6B2AA9-9B12-47CD-82EE-906D0F04B888}"/>
               </a:ext>
             </a:extLst>
           </p:cNvPr>
@@ -3686,14 +3984,25 @@
           <a:bodyPr/>
           <a:lstStyle/>
           <a:p>
-            <a:endParaRPr lang="en-US"/>
+            <a:r>
+              <a:rPr lang="en-US" dirty="0"/>
+              <a:t>User based </a:t>
+            </a:r>
+            <a:r>
+              <a:rPr lang="en-US" dirty="0" err="1"/>
+              <a:t>knn</a:t>
+            </a:r>
+            <a:r>
+              <a:rPr lang="en-US" dirty="0"/>
+              <a:t> with 5 fold CV is best</a:t>
+            </a:r>
           </a:p>
         </p:txBody>
       </p:sp>
     </p:spTree>
     <p:extLst>
       <p:ext uri="{BB962C8B-B14F-4D97-AF65-F5344CB8AC3E}">
-        <p14:creationId xmlns:p14="http://schemas.microsoft.com/office/powerpoint/2010/main" val="3581822688"/>
+        <p14:creationId xmlns:p14="http://schemas.microsoft.com/office/powerpoint/2010/main" val="3757042173"/>
       </p:ext>
     </p:extLst>
   </p:cSld>
@@ -3725,6 +4034,596 @@
           <p:cNvPr id="2" name="Title 1">
             <a:extLst>
               <a:ext uri="{FF2B5EF4-FFF2-40B4-BE49-F238E27FC236}">
+                <a16:creationId xmlns:a16="http://schemas.microsoft.com/office/drawing/2014/main" id="{EC323391-294B-4D3F-A2AB-EDE24C72573B}"/>
+              </a:ext>
+            </a:extLst>
+          </p:cNvPr>
+          <p:cNvSpPr>
+            <a:spLocks noGrp="1"/>
+          </p:cNvSpPr>
+          <p:nvPr>
+            <p:ph type="title"/>
+          </p:nvPr>
+        </p:nvSpPr>
+        <p:spPr/>
+        <p:txBody>
+          <a:bodyPr/>
+          <a:lstStyle/>
+          <a:p>
+            <a:r>
+              <a:rPr lang="en-US" dirty="0"/>
+              <a:t>Objective 2 – predict using ….</a:t>
+            </a:r>
+          </a:p>
+        </p:txBody>
+      </p:sp>
+      <p:sp>
+        <p:nvSpPr>
+          <p:cNvPr id="3" name="Content Placeholder 2">
+            <a:extLst>
+              <a:ext uri="{FF2B5EF4-FFF2-40B4-BE49-F238E27FC236}">
+                <a16:creationId xmlns:a16="http://schemas.microsoft.com/office/drawing/2014/main" id="{0BECCC59-21B5-4F53-B3F3-03B475260E11}"/>
+              </a:ext>
+            </a:extLst>
+          </p:cNvPr>
+          <p:cNvSpPr>
+            <a:spLocks noGrp="1"/>
+          </p:cNvSpPr>
+          <p:nvPr>
+            <p:ph idx="1"/>
+          </p:nvPr>
+        </p:nvSpPr>
+        <p:spPr/>
+        <p:txBody>
+          <a:bodyPr/>
+          <a:lstStyle/>
+          <a:p>
+            <a:r>
+              <a:rPr lang="en-US" dirty="0"/>
+              <a:t>Model Based Collaborative filtering</a:t>
+            </a:r>
+          </a:p>
+          <a:p>
+            <a:pPr lvl="1"/>
+            <a:r>
+              <a:rPr lang="en-US" dirty="0"/>
+              <a:t>SVD – singular value decomposition</a:t>
+            </a:r>
+          </a:p>
+          <a:p>
+            <a:pPr lvl="1"/>
+            <a:r>
+              <a:rPr lang="en-US" dirty="0"/>
+              <a:t>Recommends based on latent features of item-user matrices</a:t>
+            </a:r>
+          </a:p>
+          <a:p>
+            <a:pPr lvl="1"/>
+            <a:r>
+              <a:rPr lang="en-US" dirty="0"/>
+              <a:t>Provides rating prediction for given user</a:t>
+            </a:r>
+          </a:p>
+          <a:p>
+            <a:pPr lvl="1"/>
+            <a:endParaRPr lang="en-US" dirty="0"/>
+          </a:p>
+        </p:txBody>
+      </p:sp>
+    </p:spTree>
+    <p:extLst>
+      <p:ext uri="{BB962C8B-B14F-4D97-AF65-F5344CB8AC3E}">
+        <p14:creationId xmlns:p14="http://schemas.microsoft.com/office/powerpoint/2010/main" val="1945820125"/>
+      </p:ext>
+    </p:extLst>
+  </p:cSld>
+  <p:clrMapOvr>
+    <a:masterClrMapping/>
+  </p:clrMapOvr>
+</p:sld>
+</file>
+
+<file path=ppt/slides/slide12.xml><?xml version="1.0" encoding="utf-8"?>
+<p:sld xmlns:a="http://schemas.openxmlformats.org/drawingml/2006/main" xmlns:r="http://schemas.openxmlformats.org/officeDocument/2006/relationships" xmlns:p="http://schemas.openxmlformats.org/presentationml/2006/main">
+  <p:cSld>
+    <p:spTree>
+      <p:nvGrpSpPr>
+        <p:cNvPr id="1" name=""/>
+        <p:cNvGrpSpPr/>
+        <p:nvPr/>
+      </p:nvGrpSpPr>
+      <p:grpSpPr>
+        <a:xfrm>
+          <a:off x="0" y="0"/>
+          <a:ext cx="0" cy="0"/>
+          <a:chOff x="0" y="0"/>
+          <a:chExt cx="0" cy="0"/>
+        </a:xfrm>
+      </p:grpSpPr>
+      <p:sp>
+        <p:nvSpPr>
+          <p:cNvPr id="2" name="Title 1">
+            <a:extLst>
+              <a:ext uri="{FF2B5EF4-FFF2-40B4-BE49-F238E27FC236}">
+                <a16:creationId xmlns:a16="http://schemas.microsoft.com/office/drawing/2014/main" id="{BC01F367-4FAC-4606-821B-F225EB50AF43}"/>
+              </a:ext>
+            </a:extLst>
+          </p:cNvPr>
+          <p:cNvSpPr>
+            <a:spLocks noGrp="1"/>
+          </p:cNvSpPr>
+          <p:nvPr>
+            <p:ph type="title"/>
+          </p:nvPr>
+        </p:nvSpPr>
+        <p:spPr/>
+        <p:txBody>
+          <a:bodyPr/>
+          <a:lstStyle/>
+          <a:p>
+            <a:r>
+              <a:rPr lang="en-US" dirty="0"/>
+              <a:t>Objective 2 – Conclusion</a:t>
+            </a:r>
+          </a:p>
+        </p:txBody>
+      </p:sp>
+      <p:sp>
+        <p:nvSpPr>
+          <p:cNvPr id="3" name="Content Placeholder 2">
+            <a:extLst>
+              <a:ext uri="{FF2B5EF4-FFF2-40B4-BE49-F238E27FC236}">
+                <a16:creationId xmlns:a16="http://schemas.microsoft.com/office/drawing/2014/main" id="{4768E18A-BE94-4DDF-AFD6-160D73EC2FE4}"/>
+              </a:ext>
+            </a:extLst>
+          </p:cNvPr>
+          <p:cNvSpPr>
+            <a:spLocks noGrp="1"/>
+          </p:cNvSpPr>
+          <p:nvPr>
+            <p:ph idx="1"/>
+          </p:nvPr>
+        </p:nvSpPr>
+        <p:spPr/>
+        <p:txBody>
+          <a:bodyPr/>
+          <a:lstStyle/>
+          <a:p>
+            <a:r>
+              <a:rPr lang="en-US"/>
+              <a:t>Evaluation</a:t>
+            </a:r>
+          </a:p>
+        </p:txBody>
+      </p:sp>
+    </p:spTree>
+    <p:extLst>
+      <p:ext uri="{BB962C8B-B14F-4D97-AF65-F5344CB8AC3E}">
+        <p14:creationId xmlns:p14="http://schemas.microsoft.com/office/powerpoint/2010/main" val="745880702"/>
+      </p:ext>
+    </p:extLst>
+  </p:cSld>
+  <p:clrMapOvr>
+    <a:masterClrMapping/>
+  </p:clrMapOvr>
+</p:sld>
+</file>
+
+<file path=ppt/slides/slide13.xml><?xml version="1.0" encoding="utf-8"?>
+<p:sld xmlns:a="http://schemas.openxmlformats.org/drawingml/2006/main" xmlns:r="http://schemas.openxmlformats.org/officeDocument/2006/relationships" xmlns:p="http://schemas.openxmlformats.org/presentationml/2006/main">
+  <p:cSld>
+    <p:spTree>
+      <p:nvGrpSpPr>
+        <p:cNvPr id="1" name=""/>
+        <p:cNvGrpSpPr/>
+        <p:nvPr/>
+      </p:nvGrpSpPr>
+      <p:grpSpPr>
+        <a:xfrm>
+          <a:off x="0" y="0"/>
+          <a:ext cx="0" cy="0"/>
+          <a:chOff x="0" y="0"/>
+          <a:chExt cx="0" cy="0"/>
+        </a:xfrm>
+      </p:grpSpPr>
+      <p:sp>
+        <p:nvSpPr>
+          <p:cNvPr id="2" name="Title 1">
+            <a:extLst>
+              <a:ext uri="{FF2B5EF4-FFF2-40B4-BE49-F238E27FC236}">
+                <a16:creationId xmlns:a16="http://schemas.microsoft.com/office/drawing/2014/main" id="{56AE5E81-7C66-442A-A2AC-A999A0C2DBFF}"/>
+              </a:ext>
+            </a:extLst>
+          </p:cNvPr>
+          <p:cNvSpPr>
+            <a:spLocks noGrp="1"/>
+          </p:cNvSpPr>
+          <p:nvPr>
+            <p:ph type="title"/>
+          </p:nvPr>
+        </p:nvSpPr>
+        <p:spPr/>
+        <p:txBody>
+          <a:bodyPr/>
+          <a:lstStyle/>
+          <a:p>
+            <a:r>
+              <a:rPr lang="en-US" dirty="0" err="1"/>
+              <a:t>AzureML</a:t>
+            </a:r>
+            <a:r>
+              <a:rPr lang="en-US" dirty="0"/>
+              <a:t> no features</a:t>
+            </a:r>
+          </a:p>
+        </p:txBody>
+      </p:sp>
+      <p:sp>
+        <p:nvSpPr>
+          <p:cNvPr id="3" name="Content Placeholder 2">
+            <a:extLst>
+              <a:ext uri="{FF2B5EF4-FFF2-40B4-BE49-F238E27FC236}">
+                <a16:creationId xmlns:a16="http://schemas.microsoft.com/office/drawing/2014/main" id="{57A841A7-5E8C-4959-BE8D-682784689740}"/>
+              </a:ext>
+            </a:extLst>
+          </p:cNvPr>
+          <p:cNvSpPr>
+            <a:spLocks noGrp="1"/>
+          </p:cNvSpPr>
+          <p:nvPr>
+            <p:ph idx="1"/>
+          </p:nvPr>
+        </p:nvSpPr>
+        <p:spPr/>
+        <p:txBody>
+          <a:bodyPr/>
+          <a:lstStyle/>
+          <a:p>
+            <a:endParaRPr lang="en-US"/>
+          </a:p>
+        </p:txBody>
+      </p:sp>
+    </p:spTree>
+    <p:extLst>
+      <p:ext uri="{BB962C8B-B14F-4D97-AF65-F5344CB8AC3E}">
+        <p14:creationId xmlns:p14="http://schemas.microsoft.com/office/powerpoint/2010/main" val="3418160618"/>
+      </p:ext>
+    </p:extLst>
+  </p:cSld>
+  <p:clrMapOvr>
+    <a:masterClrMapping/>
+  </p:clrMapOvr>
+</p:sld>
+</file>
+
+<file path=ppt/slides/slide14.xml><?xml version="1.0" encoding="utf-8"?>
+<p:sld xmlns:a="http://schemas.openxmlformats.org/drawingml/2006/main" xmlns:r="http://schemas.openxmlformats.org/officeDocument/2006/relationships" xmlns:p="http://schemas.openxmlformats.org/presentationml/2006/main">
+  <p:cSld>
+    <p:spTree>
+      <p:nvGrpSpPr>
+        <p:cNvPr id="1" name=""/>
+        <p:cNvGrpSpPr/>
+        <p:nvPr/>
+      </p:nvGrpSpPr>
+      <p:grpSpPr>
+        <a:xfrm>
+          <a:off x="0" y="0"/>
+          <a:ext cx="0" cy="0"/>
+          <a:chOff x="0" y="0"/>
+          <a:chExt cx="0" cy="0"/>
+        </a:xfrm>
+      </p:grpSpPr>
+      <p:sp>
+        <p:nvSpPr>
+          <p:cNvPr id="2" name="Title 1">
+            <a:extLst>
+              <a:ext uri="{FF2B5EF4-FFF2-40B4-BE49-F238E27FC236}">
+                <a16:creationId xmlns:a16="http://schemas.microsoft.com/office/drawing/2014/main" id="{B51EBD61-4734-450B-B6AD-FDF8CEBDC4ED}"/>
+              </a:ext>
+            </a:extLst>
+          </p:cNvPr>
+          <p:cNvSpPr>
+            <a:spLocks noGrp="1"/>
+          </p:cNvSpPr>
+          <p:nvPr>
+            <p:ph type="title"/>
+          </p:nvPr>
+        </p:nvSpPr>
+        <p:spPr/>
+        <p:txBody>
+          <a:bodyPr/>
+          <a:lstStyle/>
+          <a:p>
+            <a:r>
+              <a:rPr lang="en-US" dirty="0" err="1"/>
+              <a:t>AzureML</a:t>
+            </a:r>
+            <a:r>
+              <a:rPr lang="en-US" dirty="0"/>
+              <a:t> with features</a:t>
+            </a:r>
+          </a:p>
+        </p:txBody>
+      </p:sp>
+      <p:sp>
+        <p:nvSpPr>
+          <p:cNvPr id="3" name="Content Placeholder 2">
+            <a:extLst>
+              <a:ext uri="{FF2B5EF4-FFF2-40B4-BE49-F238E27FC236}">
+                <a16:creationId xmlns:a16="http://schemas.microsoft.com/office/drawing/2014/main" id="{A692A6F2-1C55-4375-9485-2AD65C95DFFD}"/>
+              </a:ext>
+            </a:extLst>
+          </p:cNvPr>
+          <p:cNvSpPr>
+            <a:spLocks noGrp="1"/>
+          </p:cNvSpPr>
+          <p:nvPr>
+            <p:ph idx="1"/>
+          </p:nvPr>
+        </p:nvSpPr>
+        <p:spPr/>
+        <p:txBody>
+          <a:bodyPr/>
+          <a:lstStyle/>
+          <a:p>
+            <a:endParaRPr lang="en-US"/>
+          </a:p>
+        </p:txBody>
+      </p:sp>
+    </p:spTree>
+    <p:extLst>
+      <p:ext uri="{BB962C8B-B14F-4D97-AF65-F5344CB8AC3E}">
+        <p14:creationId xmlns:p14="http://schemas.microsoft.com/office/powerpoint/2010/main" val="1223573897"/>
+      </p:ext>
+    </p:extLst>
+  </p:cSld>
+  <p:clrMapOvr>
+    <a:masterClrMapping/>
+  </p:clrMapOvr>
+</p:sld>
+</file>
+
+<file path=ppt/slides/slide15.xml><?xml version="1.0" encoding="utf-8"?>
+<p:sld xmlns:a="http://schemas.openxmlformats.org/drawingml/2006/main" xmlns:r="http://schemas.openxmlformats.org/officeDocument/2006/relationships" xmlns:p="http://schemas.openxmlformats.org/presentationml/2006/main">
+  <p:cSld>
+    <p:spTree>
+      <p:nvGrpSpPr>
+        <p:cNvPr id="1" name=""/>
+        <p:cNvGrpSpPr/>
+        <p:nvPr/>
+      </p:nvGrpSpPr>
+      <p:grpSpPr>
+        <a:xfrm>
+          <a:off x="0" y="0"/>
+          <a:ext cx="0" cy="0"/>
+          <a:chOff x="0" y="0"/>
+          <a:chExt cx="0" cy="0"/>
+        </a:xfrm>
+      </p:grpSpPr>
+      <p:sp>
+        <p:nvSpPr>
+          <p:cNvPr id="2" name="Title 1">
+            <a:extLst>
+              <a:ext uri="{FF2B5EF4-FFF2-40B4-BE49-F238E27FC236}">
+                <a16:creationId xmlns:a16="http://schemas.microsoft.com/office/drawing/2014/main" id="{D69591FC-F063-4A4D-9B2D-52953DFEEAFD}"/>
+              </a:ext>
+            </a:extLst>
+          </p:cNvPr>
+          <p:cNvSpPr>
+            <a:spLocks noGrp="1"/>
+          </p:cNvSpPr>
+          <p:nvPr>
+            <p:ph type="title"/>
+          </p:nvPr>
+        </p:nvSpPr>
+        <p:spPr/>
+        <p:txBody>
+          <a:bodyPr/>
+          <a:lstStyle/>
+          <a:p>
+            <a:r>
+              <a:rPr lang="en-US" dirty="0"/>
+              <a:t>Best overall</a:t>
+            </a:r>
+          </a:p>
+        </p:txBody>
+      </p:sp>
+      <p:sp>
+        <p:nvSpPr>
+          <p:cNvPr id="3" name="Content Placeholder 2">
+            <a:extLst>
+              <a:ext uri="{FF2B5EF4-FFF2-40B4-BE49-F238E27FC236}">
+                <a16:creationId xmlns:a16="http://schemas.microsoft.com/office/drawing/2014/main" id="{E2936BF1-D1BF-451E-BAE8-6E7FA872D235}"/>
+              </a:ext>
+            </a:extLst>
+          </p:cNvPr>
+          <p:cNvSpPr>
+            <a:spLocks noGrp="1"/>
+          </p:cNvSpPr>
+          <p:nvPr>
+            <p:ph idx="1"/>
+          </p:nvPr>
+        </p:nvSpPr>
+        <p:spPr/>
+        <p:txBody>
+          <a:bodyPr/>
+          <a:lstStyle/>
+          <a:p>
+            <a:endParaRPr lang="en-US"/>
+          </a:p>
+        </p:txBody>
+      </p:sp>
+    </p:spTree>
+    <p:extLst>
+      <p:ext uri="{BB962C8B-B14F-4D97-AF65-F5344CB8AC3E}">
+        <p14:creationId xmlns:p14="http://schemas.microsoft.com/office/powerpoint/2010/main" val="1550210309"/>
+      </p:ext>
+    </p:extLst>
+  </p:cSld>
+  <p:clrMapOvr>
+    <a:masterClrMapping/>
+  </p:clrMapOvr>
+</p:sld>
+</file>
+
+<file path=ppt/slides/slide16.xml><?xml version="1.0" encoding="utf-8"?>
+<p:sld xmlns:a="http://schemas.openxmlformats.org/drawingml/2006/main" xmlns:r="http://schemas.openxmlformats.org/officeDocument/2006/relationships" xmlns:p="http://schemas.openxmlformats.org/presentationml/2006/main">
+  <p:cSld>
+    <p:spTree>
+      <p:nvGrpSpPr>
+        <p:cNvPr id="1" name=""/>
+        <p:cNvGrpSpPr/>
+        <p:nvPr/>
+      </p:nvGrpSpPr>
+      <p:grpSpPr>
+        <a:xfrm>
+          <a:off x="0" y="0"/>
+          <a:ext cx="0" cy="0"/>
+          <a:chOff x="0" y="0"/>
+          <a:chExt cx="0" cy="0"/>
+        </a:xfrm>
+      </p:grpSpPr>
+      <p:sp>
+        <p:nvSpPr>
+          <p:cNvPr id="2" name="Title 1">
+            <a:extLst>
+              <a:ext uri="{FF2B5EF4-FFF2-40B4-BE49-F238E27FC236}">
+                <a16:creationId xmlns:a16="http://schemas.microsoft.com/office/drawing/2014/main" id="{4E218467-2286-44AF-BF77-2BFAAF380B10}"/>
+              </a:ext>
+            </a:extLst>
+          </p:cNvPr>
+          <p:cNvSpPr>
+            <a:spLocks noGrp="1"/>
+          </p:cNvSpPr>
+          <p:nvPr>
+            <p:ph type="title"/>
+          </p:nvPr>
+        </p:nvSpPr>
+        <p:spPr/>
+        <p:txBody>
+          <a:bodyPr/>
+          <a:lstStyle/>
+          <a:p>
+            <a:r>
+              <a:rPr lang="en-US" dirty="0"/>
+              <a:t>References</a:t>
+            </a:r>
+          </a:p>
+        </p:txBody>
+      </p:sp>
+      <p:sp>
+        <p:nvSpPr>
+          <p:cNvPr id="3" name="Content Placeholder 2">
+            <a:extLst>
+              <a:ext uri="{FF2B5EF4-FFF2-40B4-BE49-F238E27FC236}">
+                <a16:creationId xmlns:a16="http://schemas.microsoft.com/office/drawing/2014/main" id="{40C2538A-6C5E-4FD7-8C94-7FF0951CE09A}"/>
+              </a:ext>
+            </a:extLst>
+          </p:cNvPr>
+          <p:cNvSpPr>
+            <a:spLocks noGrp="1"/>
+          </p:cNvSpPr>
+          <p:nvPr>
+            <p:ph idx="1"/>
+          </p:nvPr>
+        </p:nvSpPr>
+        <p:spPr/>
+        <p:txBody>
+          <a:bodyPr/>
+          <a:lstStyle/>
+          <a:p>
+            <a:r>
+              <a:rPr lang="en-US" dirty="0"/>
+              <a:t>Jiang, S., Li, J., &amp; Zhou, W. (2020). An Application of SVD++ Method in Collaborative Filtering</a:t>
+            </a:r>
+            <a:r>
+              <a:rPr lang="en-US" i="1" dirty="0"/>
+              <a:t>.</a:t>
+            </a:r>
+            <a:r>
+              <a:rPr lang="en-US" dirty="0"/>
+              <a:t> </a:t>
+            </a:r>
+            <a:r>
+              <a:rPr lang="en-US" i="1" dirty="0"/>
+              <a:t>2020 17th International Computer Conference on Wavelet Active Media Technology and Information Processing (ICCWAMTIP)</a:t>
+            </a:r>
+            <a:r>
+              <a:rPr lang="en-US" dirty="0"/>
+              <a:t>, Chengdu, China. pp. 192-197, </a:t>
+            </a:r>
+            <a:r>
+              <a:rPr lang="en-US" dirty="0" err="1"/>
+              <a:t>doi</a:t>
+            </a:r>
+            <a:r>
+              <a:rPr lang="en-US" dirty="0"/>
+              <a:t>: 10.1109/ICCWAMTIP51612.2020.9317347.</a:t>
+            </a:r>
+          </a:p>
+          <a:p>
+            <a:r>
+              <a:rPr lang="en-US" dirty="0"/>
+              <a:t>Stern, D., </a:t>
+            </a:r>
+            <a:r>
+              <a:rPr lang="en-US" dirty="0" err="1"/>
+              <a:t>Herbich</a:t>
+            </a:r>
+            <a:r>
+              <a:rPr lang="en-US" dirty="0"/>
+              <a:t>, R., Graepel, T. (2009). </a:t>
+            </a:r>
+            <a:r>
+              <a:rPr lang="en-US" i="1" dirty="0"/>
+              <a:t>Matchbox: Large Scale Online Bayesian Recommendations. World Wide Web Conference Com-</a:t>
+            </a:r>
+            <a:r>
+              <a:rPr lang="en-US" i="1" dirty="0" err="1"/>
+              <a:t>mittee</a:t>
+            </a:r>
+            <a:r>
+              <a:rPr lang="en-US" i="1" dirty="0"/>
+              <a:t> (IW3C2). https://www.microsoft.com/en-us/research/wp-content/uploads/2009/01/www09.pdf </a:t>
+            </a:r>
+          </a:p>
+        </p:txBody>
+      </p:sp>
+    </p:spTree>
+    <p:extLst>
+      <p:ext uri="{BB962C8B-B14F-4D97-AF65-F5344CB8AC3E}">
+        <p14:creationId xmlns:p14="http://schemas.microsoft.com/office/powerpoint/2010/main" val="3581822688"/>
+      </p:ext>
+    </p:extLst>
+  </p:cSld>
+  <p:clrMapOvr>
+    <a:masterClrMapping/>
+  </p:clrMapOvr>
+</p:sld>
+</file>
+
+<file path=ppt/slides/slide17.xml><?xml version="1.0" encoding="utf-8"?>
+<p:sld xmlns:a="http://schemas.openxmlformats.org/drawingml/2006/main" xmlns:r="http://schemas.openxmlformats.org/officeDocument/2006/relationships" xmlns:p="http://schemas.openxmlformats.org/presentationml/2006/main">
+  <p:cSld>
+    <p:spTree>
+      <p:nvGrpSpPr>
+        <p:cNvPr id="1" name=""/>
+        <p:cNvGrpSpPr/>
+        <p:nvPr/>
+      </p:nvGrpSpPr>
+      <p:grpSpPr>
+        <a:xfrm>
+          <a:off x="0" y="0"/>
+          <a:ext cx="0" cy="0"/>
+          <a:chOff x="0" y="0"/>
+          <a:chExt cx="0" cy="0"/>
+        </a:xfrm>
+      </p:grpSpPr>
+      <p:sp>
+        <p:nvSpPr>
+          <p:cNvPr id="2" name="Title 1">
+            <a:extLst>
+              <a:ext uri="{FF2B5EF4-FFF2-40B4-BE49-F238E27FC236}">
                 <a16:creationId xmlns:a16="http://schemas.microsoft.com/office/drawing/2014/main" id="{47D88EF1-D4A3-4229-96D9-72A7DFAAEC8B}"/>
               </a:ext>
             </a:extLst>
@@ -3788,16 +4687,16 @@
           </a:p>
           <a:p>
             <a:r>
-              <a:rPr lang="en-US"/>
+              <a:rPr lang="en-US" dirty="0"/>
               <a:t>SVD: </a:t>
             </a:r>
             <a:r>
-              <a:rPr lang="en-US">
+              <a:rPr lang="en-US" dirty="0">
                 <a:hlinkClick r:id="rId3"/>
               </a:rPr>
               <a:t>https://analyticsindiamag.com/singular-value-decomposition-svd-application-recommender-system/</a:t>
             </a:r>
-            <a:endParaRPr lang="en-US"/>
+            <a:endParaRPr lang="en-US" dirty="0"/>
           </a:p>
           <a:p>
             <a:endParaRPr lang="en-US" dirty="0"/>
@@ -3934,7 +4833,7 @@
 </file>
 
 <file path=ppt/slides/slide3.xml><?xml version="1.0" encoding="utf-8"?>
-<p:sld xmlns:a="http://schemas.openxmlformats.org/drawingml/2006/main" xmlns:r="http://schemas.openxmlformats.org/officeDocument/2006/relationships" xmlns:p="http://schemas.openxmlformats.org/presentationml/2006/main">
+<p:sld xmlns:a="http://schemas.openxmlformats.org/drawingml/2006/main" xmlns:r="http://schemas.openxmlformats.org/officeDocument/2006/relationships" xmlns:p="http://schemas.openxmlformats.org/presentationml/2006/main" show="0">
   <p:cSld>
     <p:spTree>
       <p:nvGrpSpPr>
@@ -4082,25 +4981,82 @@
         </p:nvSpPr>
         <p:spPr/>
         <p:txBody>
-          <a:bodyPr/>
-          <a:lstStyle/>
-          <a:p>
-            <a:r>
-              <a:rPr lang="en-US" dirty="0"/>
-              <a:t>Statement of purpose</a:t>
-            </a:r>
-          </a:p>
-          <a:p>
-            <a:r>
-              <a:rPr lang="en-US" dirty="0"/>
-              <a:t>“To predict user movie ratings using this and that algorithm”</a:t>
-            </a:r>
-          </a:p>
-          <a:p>
-            <a:r>
-              <a:rPr lang="en-US" dirty="0"/>
-              <a:t>Predict movies???</a:t>
-            </a:r>
+          <a:bodyPr>
+            <a:normAutofit fontScale="92500"/>
+          </a:bodyPr>
+          <a:lstStyle/>
+          <a:p>
+            <a:r>
+              <a:rPr lang="en-US" dirty="0"/>
+              <a:t>Compare two algorithms in the Python Surprise library with an algorithm in Microsoft </a:t>
+            </a:r>
+            <a:r>
+              <a:rPr lang="en-US" dirty="0" err="1"/>
+              <a:t>AzureML</a:t>
+            </a:r>
+            <a:r>
+              <a:rPr lang="en-US" dirty="0"/>
+              <a:t> Studio to see which is most accurate.</a:t>
+            </a:r>
+          </a:p>
+          <a:p>
+            <a:pPr lvl="1"/>
+            <a:r>
+              <a:rPr lang="en-US" dirty="0"/>
+              <a:t>Python Surprise: Specialized scikit library used for coding recommendation systems in python</a:t>
+            </a:r>
+          </a:p>
+          <a:p>
+            <a:pPr lvl="1"/>
+            <a:r>
+              <a:rPr lang="en-US" dirty="0" err="1"/>
+              <a:t>AzureML</a:t>
+            </a:r>
+            <a:r>
+              <a:rPr lang="en-US" dirty="0"/>
+              <a:t> Studio: Microsoft’s graphical user interface (GUI) machine learning application</a:t>
+            </a:r>
+          </a:p>
+          <a:p>
+            <a:r>
+              <a:rPr lang="en-US" dirty="0"/>
+              <a:t>Python Surprise Algorithms:</a:t>
+            </a:r>
+          </a:p>
+          <a:p>
+            <a:pPr lvl="1"/>
+            <a:r>
+              <a:rPr lang="en-US" dirty="0"/>
+              <a:t>K-Nearest Neighbors: Memory-based collaborative filtering </a:t>
+            </a:r>
+          </a:p>
+          <a:p>
+            <a:pPr lvl="1"/>
+            <a:r>
+              <a:rPr lang="en-US" dirty="0"/>
+              <a:t>Singular Value Decomposition: Model-based collaborative filtering</a:t>
+            </a:r>
+          </a:p>
+          <a:p>
+            <a:r>
+              <a:rPr lang="en-US" dirty="0" err="1"/>
+              <a:t>AzureML</a:t>
+            </a:r>
+            <a:r>
+              <a:rPr lang="en-US" dirty="0"/>
+              <a:t> Studio:</a:t>
+            </a:r>
+          </a:p>
+          <a:p>
+            <a:pPr lvl="1"/>
+            <a:r>
+              <a:rPr lang="en-US" dirty="0"/>
+              <a:t>Matchbox algorithm: Hybrid collaborative filtering and content-based approach</a:t>
+            </a:r>
+          </a:p>
+          <a:p>
+            <a:pPr lvl="1"/>
+            <a:endParaRPr lang="en-US" dirty="0"/>
           </a:p>
         </p:txBody>
       </p:sp>
@@ -4139,7 +5095,7 @@
           <p:cNvPr id="2" name="Title 1">
             <a:extLst>
               <a:ext uri="{FF2B5EF4-FFF2-40B4-BE49-F238E27FC236}">
-                <a16:creationId xmlns:a16="http://schemas.microsoft.com/office/drawing/2014/main" id="{5E2928AD-351A-4339-8520-EE014E97C2AA}"/>
+                <a16:creationId xmlns:a16="http://schemas.microsoft.com/office/drawing/2014/main" id="{CFEB6D4F-B155-4F48-8616-061875839A1D}"/>
               </a:ext>
             </a:extLst>
           </p:cNvPr>
@@ -4157,7 +5113,7 @@
           <a:p>
             <a:r>
               <a:rPr lang="en-US" dirty="0"/>
-              <a:t>Dataset overview</a:t>
+              <a:t>Collaborative filtering </a:t>
             </a:r>
           </a:p>
         </p:txBody>
@@ -4167,7 +5123,7 @@
           <p:cNvPr id="3" name="Content Placeholder 2">
             <a:extLst>
               <a:ext uri="{FF2B5EF4-FFF2-40B4-BE49-F238E27FC236}">
-                <a16:creationId xmlns:a16="http://schemas.microsoft.com/office/drawing/2014/main" id="{01672235-C895-4E00-BF00-E6819073AA78}"/>
+                <a16:creationId xmlns:a16="http://schemas.microsoft.com/office/drawing/2014/main" id="{26BC24FC-BA35-4EF9-8D94-F597C7317257}"/>
               </a:ext>
             </a:extLst>
           </p:cNvPr>
@@ -4185,32 +5141,96 @@
           <a:p>
             <a:r>
               <a:rPr lang="en-US" dirty="0"/>
-              <a:t>Acquired</a:t>
-            </a:r>
-          </a:p>
-          <a:p>
-            <a:r>
-              <a:rPr lang="en-US" dirty="0"/>
-              <a:t>Instances, attributes</a:t>
-            </a:r>
-          </a:p>
-          <a:p>
-            <a:r>
-              <a:rPr lang="en-US" dirty="0"/>
-              <a:t>No need to clean </a:t>
-            </a:r>
-            <a:r>
-              <a:rPr lang="en-US" dirty="0" err="1"/>
-              <a:t>MovieLens</a:t>
-            </a:r>
-            <a:endParaRPr lang="en-US" dirty="0"/>
+              <a:t>Algorithms used in recommendation systems that can be user or item-based.</a:t>
+            </a:r>
+          </a:p>
+          <a:p>
+            <a:r>
+              <a:rPr lang="en-US" dirty="0"/>
+              <a:t>Usually focuses on the user ratings of items to imply relevance to other users or items</a:t>
+            </a:r>
+          </a:p>
+          <a:p>
+            <a:r>
+              <a:rPr lang="en-US" dirty="0"/>
+              <a:t>K-Nearest Neighbor (KNN)</a:t>
+            </a:r>
+          </a:p>
+          <a:p>
+            <a:pPr lvl="1"/>
+            <a:r>
+              <a:rPr lang="en-US" dirty="0"/>
+              <a:t>Highly successful algorithm in wide use</a:t>
+            </a:r>
+          </a:p>
+          <a:p>
+            <a:pPr lvl="1"/>
+            <a:r>
+              <a:rPr lang="en-US" dirty="0"/>
+              <a:t>Issues with data sparsity</a:t>
+            </a:r>
+          </a:p>
+          <a:p>
+            <a:r>
+              <a:rPr lang="en-US" dirty="0"/>
+              <a:t>Singular Value Decomposition (SVD)</a:t>
+            </a:r>
+          </a:p>
+          <a:p>
+            <a:pPr lvl="1"/>
+            <a:r>
+              <a:rPr lang="en-US" dirty="0"/>
+              <a:t>Matrix factorization used to compensate for data sparsity</a:t>
+            </a:r>
+          </a:p>
+          <a:p>
+            <a:pPr lvl="1"/>
+            <a:r>
+              <a:rPr lang="en-US" dirty="0"/>
+              <a:t>Traditional SVD algorithm does not scale well</a:t>
+            </a:r>
+          </a:p>
+        </p:txBody>
+      </p:sp>
+      <p:sp>
+        <p:nvSpPr>
+          <p:cNvPr id="5" name="TextBox 4">
+            <a:extLst>
+              <a:ext uri="{FF2B5EF4-FFF2-40B4-BE49-F238E27FC236}">
+                <a16:creationId xmlns:a16="http://schemas.microsoft.com/office/drawing/2014/main" id="{CEFDE8C6-C98D-488A-8EBF-B3DC2E116270}"/>
+              </a:ext>
+            </a:extLst>
+          </p:cNvPr>
+          <p:cNvSpPr txBox="1"/>
+          <p:nvPr/>
+        </p:nvSpPr>
+        <p:spPr>
+          <a:xfrm>
+            <a:off x="9462782" y="6384022"/>
+            <a:ext cx="2558642" cy="369332"/>
+          </a:xfrm>
+          <a:prstGeom prst="rect">
+            <a:avLst/>
+          </a:prstGeom>
+          <a:noFill/>
+        </p:spPr>
+        <p:txBody>
+          <a:bodyPr wrap="square" rtlCol="0">
+            <a:spAutoFit/>
+          </a:bodyPr>
+          <a:lstStyle/>
+          <a:p>
+            <a:r>
+              <a:rPr lang="en-US" dirty="0"/>
+              <a:t>(Jiang, Li, &amp; Zhou, 2020)</a:t>
+            </a:r>
           </a:p>
         </p:txBody>
       </p:sp>
     </p:spTree>
     <p:extLst>
       <p:ext uri="{BB962C8B-B14F-4D97-AF65-F5344CB8AC3E}">
-        <p14:creationId xmlns:p14="http://schemas.microsoft.com/office/powerpoint/2010/main" val="3843785652"/>
+        <p14:creationId xmlns:p14="http://schemas.microsoft.com/office/powerpoint/2010/main" val="3003676372"/>
       </p:ext>
     </p:extLst>
   </p:cSld>
@@ -4242,7 +5262,7 @@
           <p:cNvPr id="2" name="Title 1">
             <a:extLst>
               <a:ext uri="{FF2B5EF4-FFF2-40B4-BE49-F238E27FC236}">
-                <a16:creationId xmlns:a16="http://schemas.microsoft.com/office/drawing/2014/main" id="{D53BA0B7-F362-4798-876E-235EACCF04B2}"/>
+                <a16:creationId xmlns:a16="http://schemas.microsoft.com/office/drawing/2014/main" id="{2F870888-3F1A-4ED6-A4BA-64282290105D}"/>
               </a:ext>
             </a:extLst>
           </p:cNvPr>
@@ -4260,7 +5280,7 @@
           <a:p>
             <a:r>
               <a:rPr lang="en-US" dirty="0"/>
-              <a:t>Objective 1 – predict using ….</a:t>
+              <a:t>Matchbox Recommender </a:t>
             </a:r>
           </a:p>
         </p:txBody>
@@ -4270,7 +5290,7 @@
           <p:cNvPr id="3" name="Content Placeholder 2">
             <a:extLst>
               <a:ext uri="{FF2B5EF4-FFF2-40B4-BE49-F238E27FC236}">
-                <a16:creationId xmlns:a16="http://schemas.microsoft.com/office/drawing/2014/main" id="{32E458F6-BE0F-4CD6-ABF2-F5FD97FF8FFC}"/>
+                <a16:creationId xmlns:a16="http://schemas.microsoft.com/office/drawing/2014/main" id="{69FFE559-3241-4F58-B2F5-9D5441E71AC8}"/>
               </a:ext>
             </a:extLst>
           </p:cNvPr>
@@ -4288,14 +5308,77 @@
           <a:p>
             <a:r>
               <a:rPr lang="en-US" dirty="0"/>
-              <a:t>Memory-based Collaborative filtering</a:t>
+              <a:t>Hybrid approach to recommendation system</a:t>
+            </a:r>
+          </a:p>
+          <a:p>
+            <a:r>
+              <a:rPr lang="en-US" dirty="0"/>
+              <a:t>Combines collaborative filtering and content-based approach</a:t>
             </a:r>
           </a:p>
           <a:p>
             <a:pPr lvl="1"/>
             <a:r>
               <a:rPr lang="en-US" dirty="0"/>
-              <a:t>KNN</a:t>
+              <a:t>Collaborative filtering: user ratings of items compared to other users that rated some of the same items. Only user and item IDs are used.</a:t>
+            </a:r>
+          </a:p>
+          <a:p>
+            <a:pPr lvl="1"/>
+            <a:r>
+              <a:rPr lang="en-US" dirty="0"/>
+              <a:t>Content-based approach: Uses features of users (age, gender, etc.) and items (author, manufacturer, etc.) to find similarities.</a:t>
+            </a:r>
+          </a:p>
+          <a:p>
+            <a:pPr lvl="1"/>
+            <a:r>
+              <a:rPr lang="en-US" dirty="0"/>
+              <a:t>Matchbox uses collaborative filtering with a content-based approach</a:t>
+            </a:r>
+          </a:p>
+        </p:txBody>
+      </p:sp>
+      <p:sp>
+        <p:nvSpPr>
+          <p:cNvPr id="4" name="TextBox 3">
+            <a:extLst>
+              <a:ext uri="{FF2B5EF4-FFF2-40B4-BE49-F238E27FC236}">
+                <a16:creationId xmlns:a16="http://schemas.microsoft.com/office/drawing/2014/main" id="{6A2134F3-D30D-4E6A-9926-3BDE35C8BCBD}"/>
+              </a:ext>
+            </a:extLst>
+          </p:cNvPr>
+          <p:cNvSpPr txBox="1"/>
+          <p:nvPr/>
+        </p:nvSpPr>
+        <p:spPr>
+          <a:xfrm>
+            <a:off x="7751428" y="6384022"/>
+            <a:ext cx="4269996" cy="369332"/>
+          </a:xfrm>
+          <a:prstGeom prst="rect">
+            <a:avLst/>
+          </a:prstGeom>
+          <a:noFill/>
+        </p:spPr>
+        <p:txBody>
+          <a:bodyPr wrap="square" rtlCol="0">
+            <a:spAutoFit/>
+          </a:bodyPr>
+          <a:lstStyle/>
+          <a:p>
+            <a:r>
+              <a:rPr lang="en-US" dirty="0"/>
+              <a:t>(Stern, </a:t>
+            </a:r>
+            <a:r>
+              <a:rPr lang="en-US" dirty="0" err="1"/>
+              <a:t>Herbich</a:t>
+            </a:r>
+            <a:r>
+              <a:rPr lang="en-US" dirty="0"/>
+              <a:t>, &amp; Graepel, 2009)</a:t>
             </a:r>
           </a:p>
         </p:txBody>
@@ -4303,7 +5386,7 @@
     </p:spTree>
     <p:extLst>
       <p:ext uri="{BB962C8B-B14F-4D97-AF65-F5344CB8AC3E}">
-        <p14:creationId xmlns:p14="http://schemas.microsoft.com/office/powerpoint/2010/main" val="3561893636"/>
+        <p14:creationId xmlns:p14="http://schemas.microsoft.com/office/powerpoint/2010/main" val="3109651658"/>
       </p:ext>
     </p:extLst>
   </p:cSld>
@@ -4335,7 +5418,7 @@
           <p:cNvPr id="2" name="Title 1">
             <a:extLst>
               <a:ext uri="{FF2B5EF4-FFF2-40B4-BE49-F238E27FC236}">
-                <a16:creationId xmlns:a16="http://schemas.microsoft.com/office/drawing/2014/main" id="{CA80252C-D5FB-4D19-9B3F-F12C2DC9F84C}"/>
+                <a16:creationId xmlns:a16="http://schemas.microsoft.com/office/drawing/2014/main" id="{5E2928AD-351A-4339-8520-EE014E97C2AA}"/>
               </a:ext>
             </a:extLst>
           </p:cNvPr>
@@ -4353,7 +5436,7 @@
           <a:p>
             <a:r>
               <a:rPr lang="en-US" dirty="0"/>
-              <a:t>Objective 1 – Conclusion</a:t>
+              <a:t>Dataset Overview</a:t>
             </a:r>
           </a:p>
         </p:txBody>
@@ -4363,7 +5446,7 @@
           <p:cNvPr id="3" name="Content Placeholder 2">
             <a:extLst>
               <a:ext uri="{FF2B5EF4-FFF2-40B4-BE49-F238E27FC236}">
-                <a16:creationId xmlns:a16="http://schemas.microsoft.com/office/drawing/2014/main" id="{0F6B2AA9-9B12-47CD-82EE-906D0F04B888}"/>
+                <a16:creationId xmlns:a16="http://schemas.microsoft.com/office/drawing/2014/main" id="{01672235-C895-4E00-BF00-E6819073AA78}"/>
               </a:ext>
             </a:extLst>
           </p:cNvPr>
@@ -4380,8 +5463,80 @@
           <a:lstStyle/>
           <a:p>
             <a:r>
-              <a:rPr lang="en-US" dirty="0"/>
-              <a:t>evaluation</a:t>
+              <a:rPr lang="en-US" dirty="0" err="1"/>
+              <a:t>MovieLens</a:t>
+            </a:r>
+            <a:r>
+              <a:rPr lang="en-US" dirty="0"/>
+              <a:t> (small)</a:t>
+            </a:r>
+          </a:p>
+          <a:p>
+            <a:pPr lvl="1"/>
+            <a:r>
+              <a:rPr lang="en-US" dirty="0"/>
+              <a:t>Ratings table used</a:t>
+            </a:r>
+          </a:p>
+          <a:p>
+            <a:pPr lvl="2"/>
+            <a:r>
+              <a:rPr lang="en-US" dirty="0"/>
+              <a:t>Attributes: </a:t>
+            </a:r>
+            <a:r>
+              <a:rPr lang="en-US" dirty="0" err="1"/>
+              <a:t>UserId</a:t>
+            </a:r>
+            <a:r>
+              <a:rPr lang="en-US" dirty="0"/>
+              <a:t>, </a:t>
+            </a:r>
+            <a:r>
+              <a:rPr lang="en-US" dirty="0" err="1"/>
+              <a:t>MovieId</a:t>
+            </a:r>
+            <a:r>
+              <a:rPr lang="en-US" dirty="0"/>
+              <a:t>, Rating, Timestamp</a:t>
+            </a:r>
+          </a:p>
+          <a:p>
+            <a:pPr lvl="1"/>
+            <a:r>
+              <a:rPr lang="en-US" dirty="0"/>
+              <a:t>No need to clean or transform</a:t>
+            </a:r>
+          </a:p>
+          <a:p>
+            <a:pPr lvl="1"/>
+            <a:r>
+              <a:rPr lang="en-US" dirty="0"/>
+              <a:t>100,837 instances</a:t>
+            </a:r>
+          </a:p>
+          <a:p>
+            <a:pPr lvl="2"/>
+            <a:r>
+              <a:rPr lang="en-US" dirty="0"/>
+              <a:t>Represents 9,000 movies rated by 600 users</a:t>
+            </a:r>
+          </a:p>
+          <a:p>
+            <a:pPr lvl="1"/>
+            <a:r>
+              <a:rPr lang="en-US" dirty="0"/>
+              <a:t>Retrieved from </a:t>
+            </a:r>
+            <a:r>
+              <a:rPr lang="en-US" dirty="0">
+                <a:hlinkClick r:id="rId2"/>
+              </a:rPr>
+              <a:t>https://grouplens.org/datasets/movielens/</a:t>
+            </a:r>
+            <a:r>
+              <a:rPr lang="en-US" dirty="0"/>
+              <a:t> on March 28, 2021</a:t>
             </a:r>
           </a:p>
         </p:txBody>
@@ -4389,7 +5544,7 @@
     </p:spTree>
     <p:extLst>
       <p:ext uri="{BB962C8B-B14F-4D97-AF65-F5344CB8AC3E}">
-        <p14:creationId xmlns:p14="http://schemas.microsoft.com/office/powerpoint/2010/main" val="3757042173"/>
+        <p14:creationId xmlns:p14="http://schemas.microsoft.com/office/powerpoint/2010/main" val="3843785652"/>
       </p:ext>
     </p:extLst>
   </p:cSld>
@@ -4421,7 +5576,7 @@
           <p:cNvPr id="2" name="Title 1">
             <a:extLst>
               <a:ext uri="{FF2B5EF4-FFF2-40B4-BE49-F238E27FC236}">
-                <a16:creationId xmlns:a16="http://schemas.microsoft.com/office/drawing/2014/main" id="{EC323391-294B-4D3F-A2AB-EDE24C72573B}"/>
+                <a16:creationId xmlns:a16="http://schemas.microsoft.com/office/drawing/2014/main" id="{D53BA0B7-F362-4798-876E-235EACCF04B2}"/>
               </a:ext>
             </a:extLst>
           </p:cNvPr>
@@ -4439,68 +5594,388 @@
           <a:p>
             <a:r>
               <a:rPr lang="en-US" dirty="0"/>
-              <a:t>Objective 2 – predict using ….</a:t>
-            </a:r>
-          </a:p>
-        </p:txBody>
-      </p:sp>
-      <p:sp>
-        <p:nvSpPr>
-          <p:cNvPr id="3" name="Content Placeholder 2">
-            <a:extLst>
-              <a:ext uri="{FF2B5EF4-FFF2-40B4-BE49-F238E27FC236}">
-                <a16:creationId xmlns:a16="http://schemas.microsoft.com/office/drawing/2014/main" id="{0BECCC59-21B5-4F53-B3F3-03B475260E11}"/>
-              </a:ext>
-            </a:extLst>
-          </p:cNvPr>
-          <p:cNvSpPr>
-            <a:spLocks noGrp="1"/>
-          </p:cNvSpPr>
-          <p:nvPr>
-            <p:ph idx="1"/>
-          </p:nvPr>
-        </p:nvSpPr>
-        <p:spPr/>
-        <p:txBody>
-          <a:bodyPr/>
-          <a:lstStyle/>
-          <a:p>
-            <a:r>
-              <a:rPr lang="en-US" dirty="0"/>
-              <a:t>Model Based Collaborative filtering</a:t>
-            </a:r>
-          </a:p>
-          <a:p>
-            <a:pPr lvl="1"/>
-            <a:r>
-              <a:rPr lang="en-US" dirty="0"/>
-              <a:t>SVD – singular value decomposition</a:t>
-            </a:r>
-          </a:p>
-          <a:p>
-            <a:pPr lvl="1"/>
-            <a:r>
-              <a:rPr lang="en-US" dirty="0"/>
-              <a:t>Recommends based on latent features of item-user matrices</a:t>
-            </a:r>
-          </a:p>
-          <a:p>
-            <a:pPr lvl="1"/>
-            <a:r>
-              <a:rPr lang="en-US" dirty="0"/>
-              <a:t>Provides rating prediction for given user</a:t>
-            </a:r>
-          </a:p>
-          <a:p>
-            <a:pPr lvl="1"/>
+              <a:t>K-Nearest Neighbor (KNN) – Cosine Similarity</a:t>
+            </a:r>
+          </a:p>
+        </p:txBody>
+      </p:sp>
+      <p:sp>
+        <p:nvSpPr>
+          <p:cNvPr id="4" name="Text Placeholder 3">
+            <a:extLst>
+              <a:ext uri="{FF2B5EF4-FFF2-40B4-BE49-F238E27FC236}">
+                <a16:creationId xmlns:a16="http://schemas.microsoft.com/office/drawing/2014/main" id="{3B70AEEC-D3C8-473B-BB32-C808DED825D2}"/>
+              </a:ext>
+            </a:extLst>
+          </p:cNvPr>
+          <p:cNvSpPr>
+            <a:spLocks noGrp="1"/>
+          </p:cNvSpPr>
+          <p:nvPr>
+            <p:ph type="body" idx="1"/>
+          </p:nvPr>
+        </p:nvSpPr>
+        <p:spPr/>
+        <p:txBody>
+          <a:bodyPr/>
+          <a:lstStyle/>
+          <a:p>
+            <a:r>
+              <a:rPr lang="en-US" dirty="0"/>
+              <a:t>User based</a:t>
+            </a:r>
+          </a:p>
+        </p:txBody>
+      </p:sp>
+      <p:pic>
+        <p:nvPicPr>
+          <p:cNvPr id="12" name="Content Placeholder 11">
+            <a:extLst>
+              <a:ext uri="{FF2B5EF4-FFF2-40B4-BE49-F238E27FC236}">
+                <a16:creationId xmlns:a16="http://schemas.microsoft.com/office/drawing/2014/main" id="{F09D7F65-1B1D-4F8B-8879-66DA5F8B8A74}"/>
+              </a:ext>
+            </a:extLst>
+          </p:cNvPr>
+          <p:cNvPicPr>
+            <a:picLocks noGrp="1" noChangeAspect="1"/>
+          </p:cNvPicPr>
+          <p:nvPr>
+            <p:ph sz="half" idx="2"/>
+          </p:nvPr>
+        </p:nvPicPr>
+        <p:blipFill>
+          <a:blip r:embed="rId2"/>
+          <a:stretch>
+            <a:fillRect/>
+          </a:stretch>
+        </p:blipFill>
+        <p:spPr>
+          <a:xfrm>
+            <a:off x="839788" y="2770482"/>
+            <a:ext cx="5157787" cy="1234486"/>
+          </a:xfrm>
+        </p:spPr>
+      </p:pic>
+      <p:sp>
+        <p:nvSpPr>
+          <p:cNvPr id="6" name="Text Placeholder 5">
+            <a:extLst>
+              <a:ext uri="{FF2B5EF4-FFF2-40B4-BE49-F238E27FC236}">
+                <a16:creationId xmlns:a16="http://schemas.microsoft.com/office/drawing/2014/main" id="{C2BD5F8F-635E-4BB2-9F7E-49FADAC9294A}"/>
+              </a:ext>
+            </a:extLst>
+          </p:cNvPr>
+          <p:cNvSpPr>
+            <a:spLocks noGrp="1"/>
+          </p:cNvSpPr>
+          <p:nvPr>
+            <p:ph type="body" sz="quarter" idx="3"/>
+          </p:nvPr>
+        </p:nvSpPr>
+        <p:spPr/>
+        <p:txBody>
+          <a:bodyPr/>
+          <a:lstStyle/>
+          <a:p>
+            <a:r>
+              <a:rPr lang="en-US" dirty="0"/>
+              <a:t>Item based</a:t>
+            </a:r>
+          </a:p>
+        </p:txBody>
+      </p:sp>
+      <p:pic>
+        <p:nvPicPr>
+          <p:cNvPr id="14" name="Content Placeholder 13">
+            <a:extLst>
+              <a:ext uri="{FF2B5EF4-FFF2-40B4-BE49-F238E27FC236}">
+                <a16:creationId xmlns:a16="http://schemas.microsoft.com/office/drawing/2014/main" id="{1FBD36CB-C59E-4F34-ABED-84E475101C51}"/>
+              </a:ext>
+            </a:extLst>
+          </p:cNvPr>
+          <p:cNvPicPr>
+            <a:picLocks noGrp="1" noChangeAspect="1"/>
+          </p:cNvPicPr>
+          <p:nvPr>
+            <p:ph sz="quarter" idx="4"/>
+          </p:nvPr>
+        </p:nvPicPr>
+        <p:blipFill>
+          <a:blip r:embed="rId3"/>
+          <a:stretch>
+            <a:fillRect/>
+          </a:stretch>
+        </p:blipFill>
+        <p:spPr>
+          <a:xfrm>
+            <a:off x="6194427" y="2750514"/>
+            <a:ext cx="5183188" cy="1248431"/>
+          </a:xfrm>
+        </p:spPr>
+      </p:pic>
+      <p:sp>
+        <p:nvSpPr>
+          <p:cNvPr id="8" name="Content Placeholder 4">
+            <a:extLst>
+              <a:ext uri="{FF2B5EF4-FFF2-40B4-BE49-F238E27FC236}">
+                <a16:creationId xmlns:a16="http://schemas.microsoft.com/office/drawing/2014/main" id="{F710921E-18D1-407C-82C0-1D3FD39218D3}"/>
+              </a:ext>
+            </a:extLst>
+          </p:cNvPr>
+          <p:cNvSpPr txBox="1">
+            <a:spLocks/>
+          </p:cNvSpPr>
+          <p:nvPr/>
+        </p:nvSpPr>
+        <p:spPr>
+          <a:xfrm>
+            <a:off x="927100" y="4269996"/>
+            <a:ext cx="5157787" cy="1764921"/>
+          </a:xfrm>
+          <a:prstGeom prst="rect">
+            <a:avLst/>
+          </a:prstGeom>
+        </p:spPr>
+        <p:txBody>
+          <a:bodyPr vert="horz" lIns="91440" tIns="45720" rIns="91440" bIns="45720" rtlCol="0">
+            <a:normAutofit/>
+          </a:bodyPr>
+          <a:lstStyle>
+            <a:lvl1pPr marL="228600" indent="-228600" algn="l" defTabSz="914400" rtl="0" eaLnBrk="1" latinLnBrk="0" hangingPunct="1">
+              <a:lnSpc>
+                <a:spcPct val="90000"/>
+              </a:lnSpc>
+              <a:spcBef>
+                <a:spcPts val="1000"/>
+              </a:spcBef>
+              <a:buFont typeface="Arial" panose="020B0604020202020204" pitchFamily="34" charset="0"/>
+              <a:buChar char="•"/>
+              <a:defRPr sz="2800" kern="1200">
+                <a:solidFill>
+                  <a:schemeClr val="tx1"/>
+                </a:solidFill>
+                <a:latin typeface="+mn-lt"/>
+                <a:ea typeface="+mn-ea"/>
+                <a:cs typeface="+mn-cs"/>
+              </a:defRPr>
+            </a:lvl1pPr>
+            <a:lvl2pPr marL="685800" indent="-228600" algn="l" defTabSz="914400" rtl="0" eaLnBrk="1" latinLnBrk="0" hangingPunct="1">
+              <a:lnSpc>
+                <a:spcPct val="90000"/>
+              </a:lnSpc>
+              <a:spcBef>
+                <a:spcPts val="500"/>
+              </a:spcBef>
+              <a:buFont typeface="Arial" panose="020B0604020202020204" pitchFamily="34" charset="0"/>
+              <a:buChar char="•"/>
+              <a:defRPr sz="2400" kern="1200">
+                <a:solidFill>
+                  <a:schemeClr val="tx1"/>
+                </a:solidFill>
+                <a:latin typeface="+mn-lt"/>
+                <a:ea typeface="+mn-ea"/>
+                <a:cs typeface="+mn-cs"/>
+              </a:defRPr>
+            </a:lvl2pPr>
+            <a:lvl3pPr marL="1143000" indent="-228600" algn="l" defTabSz="914400" rtl="0" eaLnBrk="1" latinLnBrk="0" hangingPunct="1">
+              <a:lnSpc>
+                <a:spcPct val="90000"/>
+              </a:lnSpc>
+              <a:spcBef>
+                <a:spcPts val="500"/>
+              </a:spcBef>
+              <a:buFont typeface="Arial" panose="020B0604020202020204" pitchFamily="34" charset="0"/>
+              <a:buChar char="•"/>
+              <a:defRPr sz="2000" kern="1200">
+                <a:solidFill>
+                  <a:schemeClr val="tx1"/>
+                </a:solidFill>
+                <a:latin typeface="+mn-lt"/>
+                <a:ea typeface="+mn-ea"/>
+                <a:cs typeface="+mn-cs"/>
+              </a:defRPr>
+            </a:lvl3pPr>
+            <a:lvl4pPr marL="1600200" indent="-228600" algn="l" defTabSz="914400" rtl="0" eaLnBrk="1" latinLnBrk="0" hangingPunct="1">
+              <a:lnSpc>
+                <a:spcPct val="90000"/>
+              </a:lnSpc>
+              <a:spcBef>
+                <a:spcPts val="500"/>
+              </a:spcBef>
+              <a:buFont typeface="Arial" panose="020B0604020202020204" pitchFamily="34" charset="0"/>
+              <a:buChar char="•"/>
+              <a:defRPr sz="1800" kern="1200">
+                <a:solidFill>
+                  <a:schemeClr val="tx1"/>
+                </a:solidFill>
+                <a:latin typeface="+mn-lt"/>
+                <a:ea typeface="+mn-ea"/>
+                <a:cs typeface="+mn-cs"/>
+              </a:defRPr>
+            </a:lvl4pPr>
+            <a:lvl5pPr marL="2057400" indent="-228600" algn="l" defTabSz="914400" rtl="0" eaLnBrk="1" latinLnBrk="0" hangingPunct="1">
+              <a:lnSpc>
+                <a:spcPct val="90000"/>
+              </a:lnSpc>
+              <a:spcBef>
+                <a:spcPts val="500"/>
+              </a:spcBef>
+              <a:buFont typeface="Arial" panose="020B0604020202020204" pitchFamily="34" charset="0"/>
+              <a:buChar char="•"/>
+              <a:defRPr sz="1800" kern="1200">
+                <a:solidFill>
+                  <a:schemeClr val="tx1"/>
+                </a:solidFill>
+                <a:latin typeface="+mn-lt"/>
+                <a:ea typeface="+mn-ea"/>
+                <a:cs typeface="+mn-cs"/>
+              </a:defRPr>
+            </a:lvl5pPr>
+            <a:lvl6pPr marL="2514600" indent="-228600" algn="l" defTabSz="914400" rtl="0" eaLnBrk="1" latinLnBrk="0" hangingPunct="1">
+              <a:lnSpc>
+                <a:spcPct val="90000"/>
+              </a:lnSpc>
+              <a:spcBef>
+                <a:spcPts val="500"/>
+              </a:spcBef>
+              <a:buFont typeface="Arial" panose="020B0604020202020204" pitchFamily="34" charset="0"/>
+              <a:buChar char="•"/>
+              <a:defRPr sz="1800" kern="1200">
+                <a:solidFill>
+                  <a:schemeClr val="tx1"/>
+                </a:solidFill>
+                <a:latin typeface="+mn-lt"/>
+                <a:ea typeface="+mn-ea"/>
+                <a:cs typeface="+mn-cs"/>
+              </a:defRPr>
+            </a:lvl6pPr>
+            <a:lvl7pPr marL="2971800" indent="-228600" algn="l" defTabSz="914400" rtl="0" eaLnBrk="1" latinLnBrk="0" hangingPunct="1">
+              <a:lnSpc>
+                <a:spcPct val="90000"/>
+              </a:lnSpc>
+              <a:spcBef>
+                <a:spcPts val="500"/>
+              </a:spcBef>
+              <a:buFont typeface="Arial" panose="020B0604020202020204" pitchFamily="34" charset="0"/>
+              <a:buChar char="•"/>
+              <a:defRPr sz="1800" kern="1200">
+                <a:solidFill>
+                  <a:schemeClr val="tx1"/>
+                </a:solidFill>
+                <a:latin typeface="+mn-lt"/>
+                <a:ea typeface="+mn-ea"/>
+                <a:cs typeface="+mn-cs"/>
+              </a:defRPr>
+            </a:lvl7pPr>
+            <a:lvl8pPr marL="3429000" indent="-228600" algn="l" defTabSz="914400" rtl="0" eaLnBrk="1" latinLnBrk="0" hangingPunct="1">
+              <a:lnSpc>
+                <a:spcPct val="90000"/>
+              </a:lnSpc>
+              <a:spcBef>
+                <a:spcPts val="500"/>
+              </a:spcBef>
+              <a:buFont typeface="Arial" panose="020B0604020202020204" pitchFamily="34" charset="0"/>
+              <a:buChar char="•"/>
+              <a:defRPr sz="1800" kern="1200">
+                <a:solidFill>
+                  <a:schemeClr val="tx1"/>
+                </a:solidFill>
+                <a:latin typeface="+mn-lt"/>
+                <a:ea typeface="+mn-ea"/>
+                <a:cs typeface="+mn-cs"/>
+              </a:defRPr>
+            </a:lvl8pPr>
+            <a:lvl9pPr marL="3886200" indent="-228600" algn="l" defTabSz="914400" rtl="0" eaLnBrk="1" latinLnBrk="0" hangingPunct="1">
+              <a:lnSpc>
+                <a:spcPct val="90000"/>
+              </a:lnSpc>
+              <a:spcBef>
+                <a:spcPts val="500"/>
+              </a:spcBef>
+              <a:buFont typeface="Arial" panose="020B0604020202020204" pitchFamily="34" charset="0"/>
+              <a:buChar char="•"/>
+              <a:defRPr sz="1800" kern="1200">
+                <a:solidFill>
+                  <a:schemeClr val="tx1"/>
+                </a:solidFill>
+                <a:latin typeface="+mn-lt"/>
+                <a:ea typeface="+mn-ea"/>
+                <a:cs typeface="+mn-cs"/>
+              </a:defRPr>
+            </a:lvl9pPr>
+          </a:lstStyle>
+          <a:p>
+            <a:pPr marL="0" indent="0">
+              <a:buNone/>
+            </a:pPr>
             <a:endParaRPr lang="en-US" dirty="0"/>
           </a:p>
         </p:txBody>
       </p:sp>
+      <p:pic>
+        <p:nvPicPr>
+          <p:cNvPr id="10" name="Picture 9">
+            <a:extLst>
+              <a:ext uri="{FF2B5EF4-FFF2-40B4-BE49-F238E27FC236}">
+                <a16:creationId xmlns:a16="http://schemas.microsoft.com/office/drawing/2014/main" id="{E4860A78-64DD-4E4A-8273-4B6A0FC66D93}"/>
+              </a:ext>
+            </a:extLst>
+          </p:cNvPr>
+          <p:cNvPicPr>
+            <a:picLocks noChangeAspect="1"/>
+          </p:cNvPicPr>
+          <p:nvPr/>
+        </p:nvPicPr>
+        <p:blipFill>
+          <a:blip r:embed="rId4"/>
+          <a:stretch>
+            <a:fillRect/>
+          </a:stretch>
+        </p:blipFill>
+        <p:spPr>
+          <a:xfrm>
+            <a:off x="581082" y="4039179"/>
+            <a:ext cx="5416492" cy="827978"/>
+          </a:xfrm>
+          <a:prstGeom prst="rect">
+            <a:avLst/>
+          </a:prstGeom>
+        </p:spPr>
+      </p:pic>
+      <p:pic>
+        <p:nvPicPr>
+          <p:cNvPr id="16" name="Picture 15">
+            <a:extLst>
+              <a:ext uri="{FF2B5EF4-FFF2-40B4-BE49-F238E27FC236}">
+                <a16:creationId xmlns:a16="http://schemas.microsoft.com/office/drawing/2014/main" id="{A507E991-8A38-47D8-9498-0DEE248BE9A3}"/>
+              </a:ext>
+            </a:extLst>
+          </p:cNvPr>
+          <p:cNvPicPr>
+            <a:picLocks noChangeAspect="1"/>
+          </p:cNvPicPr>
+          <p:nvPr/>
+        </p:nvPicPr>
+        <p:blipFill>
+          <a:blip r:embed="rId5"/>
+          <a:stretch>
+            <a:fillRect/>
+          </a:stretch>
+        </p:blipFill>
+        <p:spPr>
+          <a:xfrm>
+            <a:off x="6194427" y="4039179"/>
+            <a:ext cx="4911415" cy="827978"/>
+          </a:xfrm>
+          <a:prstGeom prst="rect">
+            <a:avLst/>
+          </a:prstGeom>
+        </p:spPr>
+      </p:pic>
     </p:spTree>
     <p:extLst>
       <p:ext uri="{BB962C8B-B14F-4D97-AF65-F5344CB8AC3E}">
-        <p14:creationId xmlns:p14="http://schemas.microsoft.com/office/powerpoint/2010/main" val="1945820125"/>
+        <p14:creationId xmlns:p14="http://schemas.microsoft.com/office/powerpoint/2010/main" val="3561893636"/>
       </p:ext>
     </p:extLst>
   </p:cSld>
@@ -4532,7 +6007,7 @@
           <p:cNvPr id="2" name="Title 1">
             <a:extLst>
               <a:ext uri="{FF2B5EF4-FFF2-40B4-BE49-F238E27FC236}">
-                <a16:creationId xmlns:a16="http://schemas.microsoft.com/office/drawing/2014/main" id="{BC01F367-4FAC-4606-821B-F225EB50AF43}"/>
+                <a16:creationId xmlns:a16="http://schemas.microsoft.com/office/drawing/2014/main" id="{D53BA0B7-F362-4798-876E-235EACCF04B2}"/>
               </a:ext>
             </a:extLst>
           </p:cNvPr>
@@ -4550,43 +6025,399 @@
           <a:p>
             <a:r>
               <a:rPr lang="en-US" dirty="0"/>
-              <a:t>Objective 2 – Conclusion</a:t>
-            </a:r>
-          </a:p>
-        </p:txBody>
-      </p:sp>
-      <p:sp>
-        <p:nvSpPr>
-          <p:cNvPr id="3" name="Content Placeholder 2">
-            <a:extLst>
-              <a:ext uri="{FF2B5EF4-FFF2-40B4-BE49-F238E27FC236}">
-                <a16:creationId xmlns:a16="http://schemas.microsoft.com/office/drawing/2014/main" id="{4768E18A-BE94-4DDF-AFD6-160D73EC2FE4}"/>
-              </a:ext>
-            </a:extLst>
-          </p:cNvPr>
-          <p:cNvSpPr>
-            <a:spLocks noGrp="1"/>
-          </p:cNvSpPr>
-          <p:nvPr>
-            <p:ph idx="1"/>
-          </p:nvPr>
-        </p:nvSpPr>
-        <p:spPr/>
-        <p:txBody>
-          <a:bodyPr/>
-          <a:lstStyle/>
-          <a:p>
-            <a:r>
-              <a:rPr lang="en-US"/>
-              <a:t>Evaluation</a:t>
-            </a:r>
-          </a:p>
-        </p:txBody>
-      </p:sp>
+              <a:t>K-Nearest Neighbor (KNN) – Cosine Similarity</a:t>
+            </a:r>
+          </a:p>
+        </p:txBody>
+      </p:sp>
+      <p:sp>
+        <p:nvSpPr>
+          <p:cNvPr id="4" name="Text Placeholder 3">
+            <a:extLst>
+              <a:ext uri="{FF2B5EF4-FFF2-40B4-BE49-F238E27FC236}">
+                <a16:creationId xmlns:a16="http://schemas.microsoft.com/office/drawing/2014/main" id="{3B70AEEC-D3C8-473B-BB32-C808DED825D2}"/>
+              </a:ext>
+            </a:extLst>
+          </p:cNvPr>
+          <p:cNvSpPr>
+            <a:spLocks noGrp="1"/>
+          </p:cNvSpPr>
+          <p:nvPr>
+            <p:ph type="body" idx="1"/>
+          </p:nvPr>
+        </p:nvSpPr>
+        <p:spPr>
+          <a:xfrm>
+            <a:off x="686147" y="1690688"/>
+            <a:ext cx="5157787" cy="823912"/>
+          </a:xfrm>
+        </p:spPr>
+        <p:txBody>
+          <a:bodyPr/>
+          <a:lstStyle/>
+          <a:p>
+            <a:r>
+              <a:rPr lang="en-US" dirty="0"/>
+              <a:t>User based 5-fold CV</a:t>
+            </a:r>
+          </a:p>
+        </p:txBody>
+      </p:sp>
+      <p:pic>
+        <p:nvPicPr>
+          <p:cNvPr id="12" name="Content Placeholder 11">
+            <a:extLst>
+              <a:ext uri="{FF2B5EF4-FFF2-40B4-BE49-F238E27FC236}">
+                <a16:creationId xmlns:a16="http://schemas.microsoft.com/office/drawing/2014/main" id="{F09D7F65-1B1D-4F8B-8879-66DA5F8B8A74}"/>
+              </a:ext>
+            </a:extLst>
+          </p:cNvPr>
+          <p:cNvPicPr>
+            <a:picLocks noGrp="1" noChangeAspect="1"/>
+          </p:cNvPicPr>
+          <p:nvPr>
+            <p:ph sz="half" idx="2"/>
+          </p:nvPr>
+        </p:nvPicPr>
+        <p:blipFill>
+          <a:blip r:embed="rId2"/>
+          <a:stretch>
+            <a:fillRect/>
+          </a:stretch>
+        </p:blipFill>
+        <p:spPr>
+          <a:xfrm>
+            <a:off x="686147" y="2780007"/>
+            <a:ext cx="5157787" cy="1234486"/>
+          </a:xfrm>
+        </p:spPr>
+      </p:pic>
+      <p:sp>
+        <p:nvSpPr>
+          <p:cNvPr id="6" name="Text Placeholder 5">
+            <a:extLst>
+              <a:ext uri="{FF2B5EF4-FFF2-40B4-BE49-F238E27FC236}">
+                <a16:creationId xmlns:a16="http://schemas.microsoft.com/office/drawing/2014/main" id="{C2BD5F8F-635E-4BB2-9F7E-49FADAC9294A}"/>
+              </a:ext>
+            </a:extLst>
+          </p:cNvPr>
+          <p:cNvSpPr>
+            <a:spLocks noGrp="1"/>
+          </p:cNvSpPr>
+          <p:nvPr>
+            <p:ph type="body" sz="quarter" idx="3"/>
+          </p:nvPr>
+        </p:nvSpPr>
+        <p:spPr/>
+        <p:txBody>
+          <a:bodyPr/>
+          <a:lstStyle/>
+          <a:p>
+            <a:r>
+              <a:rPr lang="en-US" dirty="0"/>
+              <a:t>User based </a:t>
+            </a:r>
+            <a:r>
+              <a:rPr lang="en-US" dirty="0" err="1"/>
+              <a:t>GridSearchCV</a:t>
+            </a:r>
+            <a:endParaRPr lang="en-US" dirty="0"/>
+          </a:p>
+        </p:txBody>
+      </p:sp>
+      <p:sp>
+        <p:nvSpPr>
+          <p:cNvPr id="8" name="Content Placeholder 4">
+            <a:extLst>
+              <a:ext uri="{FF2B5EF4-FFF2-40B4-BE49-F238E27FC236}">
+                <a16:creationId xmlns:a16="http://schemas.microsoft.com/office/drawing/2014/main" id="{F710921E-18D1-407C-82C0-1D3FD39218D3}"/>
+              </a:ext>
+            </a:extLst>
+          </p:cNvPr>
+          <p:cNvSpPr txBox="1">
+            <a:spLocks/>
+          </p:cNvSpPr>
+          <p:nvPr/>
+        </p:nvSpPr>
+        <p:spPr>
+          <a:xfrm>
+            <a:off x="927100" y="4269996"/>
+            <a:ext cx="5157787" cy="1764921"/>
+          </a:xfrm>
+          <a:prstGeom prst="rect">
+            <a:avLst/>
+          </a:prstGeom>
+        </p:spPr>
+        <p:txBody>
+          <a:bodyPr vert="horz" lIns="91440" tIns="45720" rIns="91440" bIns="45720" rtlCol="0">
+            <a:normAutofit/>
+          </a:bodyPr>
+          <a:lstStyle>
+            <a:lvl1pPr marL="228600" indent="-228600" algn="l" defTabSz="914400" rtl="0" eaLnBrk="1" latinLnBrk="0" hangingPunct="1">
+              <a:lnSpc>
+                <a:spcPct val="90000"/>
+              </a:lnSpc>
+              <a:spcBef>
+                <a:spcPts val="1000"/>
+              </a:spcBef>
+              <a:buFont typeface="Arial" panose="020B0604020202020204" pitchFamily="34" charset="0"/>
+              <a:buChar char="•"/>
+              <a:defRPr sz="2800" kern="1200">
+                <a:solidFill>
+                  <a:schemeClr val="tx1"/>
+                </a:solidFill>
+                <a:latin typeface="+mn-lt"/>
+                <a:ea typeface="+mn-ea"/>
+                <a:cs typeface="+mn-cs"/>
+              </a:defRPr>
+            </a:lvl1pPr>
+            <a:lvl2pPr marL="685800" indent="-228600" algn="l" defTabSz="914400" rtl="0" eaLnBrk="1" latinLnBrk="0" hangingPunct="1">
+              <a:lnSpc>
+                <a:spcPct val="90000"/>
+              </a:lnSpc>
+              <a:spcBef>
+                <a:spcPts val="500"/>
+              </a:spcBef>
+              <a:buFont typeface="Arial" panose="020B0604020202020204" pitchFamily="34" charset="0"/>
+              <a:buChar char="•"/>
+              <a:defRPr sz="2400" kern="1200">
+                <a:solidFill>
+                  <a:schemeClr val="tx1"/>
+                </a:solidFill>
+                <a:latin typeface="+mn-lt"/>
+                <a:ea typeface="+mn-ea"/>
+                <a:cs typeface="+mn-cs"/>
+              </a:defRPr>
+            </a:lvl2pPr>
+            <a:lvl3pPr marL="1143000" indent="-228600" algn="l" defTabSz="914400" rtl="0" eaLnBrk="1" latinLnBrk="0" hangingPunct="1">
+              <a:lnSpc>
+                <a:spcPct val="90000"/>
+              </a:lnSpc>
+              <a:spcBef>
+                <a:spcPts val="500"/>
+              </a:spcBef>
+              <a:buFont typeface="Arial" panose="020B0604020202020204" pitchFamily="34" charset="0"/>
+              <a:buChar char="•"/>
+              <a:defRPr sz="2000" kern="1200">
+                <a:solidFill>
+                  <a:schemeClr val="tx1"/>
+                </a:solidFill>
+                <a:latin typeface="+mn-lt"/>
+                <a:ea typeface="+mn-ea"/>
+                <a:cs typeface="+mn-cs"/>
+              </a:defRPr>
+            </a:lvl3pPr>
+            <a:lvl4pPr marL="1600200" indent="-228600" algn="l" defTabSz="914400" rtl="0" eaLnBrk="1" latinLnBrk="0" hangingPunct="1">
+              <a:lnSpc>
+                <a:spcPct val="90000"/>
+              </a:lnSpc>
+              <a:spcBef>
+                <a:spcPts val="500"/>
+              </a:spcBef>
+              <a:buFont typeface="Arial" panose="020B0604020202020204" pitchFamily="34" charset="0"/>
+              <a:buChar char="•"/>
+              <a:defRPr sz="1800" kern="1200">
+                <a:solidFill>
+                  <a:schemeClr val="tx1"/>
+                </a:solidFill>
+                <a:latin typeface="+mn-lt"/>
+                <a:ea typeface="+mn-ea"/>
+                <a:cs typeface="+mn-cs"/>
+              </a:defRPr>
+            </a:lvl4pPr>
+            <a:lvl5pPr marL="2057400" indent="-228600" algn="l" defTabSz="914400" rtl="0" eaLnBrk="1" latinLnBrk="0" hangingPunct="1">
+              <a:lnSpc>
+                <a:spcPct val="90000"/>
+              </a:lnSpc>
+              <a:spcBef>
+                <a:spcPts val="500"/>
+              </a:spcBef>
+              <a:buFont typeface="Arial" panose="020B0604020202020204" pitchFamily="34" charset="0"/>
+              <a:buChar char="•"/>
+              <a:defRPr sz="1800" kern="1200">
+                <a:solidFill>
+                  <a:schemeClr val="tx1"/>
+                </a:solidFill>
+                <a:latin typeface="+mn-lt"/>
+                <a:ea typeface="+mn-ea"/>
+                <a:cs typeface="+mn-cs"/>
+              </a:defRPr>
+            </a:lvl5pPr>
+            <a:lvl6pPr marL="2514600" indent="-228600" algn="l" defTabSz="914400" rtl="0" eaLnBrk="1" latinLnBrk="0" hangingPunct="1">
+              <a:lnSpc>
+                <a:spcPct val="90000"/>
+              </a:lnSpc>
+              <a:spcBef>
+                <a:spcPts val="500"/>
+              </a:spcBef>
+              <a:buFont typeface="Arial" panose="020B0604020202020204" pitchFamily="34" charset="0"/>
+              <a:buChar char="•"/>
+              <a:defRPr sz="1800" kern="1200">
+                <a:solidFill>
+                  <a:schemeClr val="tx1"/>
+                </a:solidFill>
+                <a:latin typeface="+mn-lt"/>
+                <a:ea typeface="+mn-ea"/>
+                <a:cs typeface="+mn-cs"/>
+              </a:defRPr>
+            </a:lvl6pPr>
+            <a:lvl7pPr marL="2971800" indent="-228600" algn="l" defTabSz="914400" rtl="0" eaLnBrk="1" latinLnBrk="0" hangingPunct="1">
+              <a:lnSpc>
+                <a:spcPct val="90000"/>
+              </a:lnSpc>
+              <a:spcBef>
+                <a:spcPts val="500"/>
+              </a:spcBef>
+              <a:buFont typeface="Arial" panose="020B0604020202020204" pitchFamily="34" charset="0"/>
+              <a:buChar char="•"/>
+              <a:defRPr sz="1800" kern="1200">
+                <a:solidFill>
+                  <a:schemeClr val="tx1"/>
+                </a:solidFill>
+                <a:latin typeface="+mn-lt"/>
+                <a:ea typeface="+mn-ea"/>
+                <a:cs typeface="+mn-cs"/>
+              </a:defRPr>
+            </a:lvl7pPr>
+            <a:lvl8pPr marL="3429000" indent="-228600" algn="l" defTabSz="914400" rtl="0" eaLnBrk="1" latinLnBrk="0" hangingPunct="1">
+              <a:lnSpc>
+                <a:spcPct val="90000"/>
+              </a:lnSpc>
+              <a:spcBef>
+                <a:spcPts val="500"/>
+              </a:spcBef>
+              <a:buFont typeface="Arial" panose="020B0604020202020204" pitchFamily="34" charset="0"/>
+              <a:buChar char="•"/>
+              <a:defRPr sz="1800" kern="1200">
+                <a:solidFill>
+                  <a:schemeClr val="tx1"/>
+                </a:solidFill>
+                <a:latin typeface="+mn-lt"/>
+                <a:ea typeface="+mn-ea"/>
+                <a:cs typeface="+mn-cs"/>
+              </a:defRPr>
+            </a:lvl8pPr>
+            <a:lvl9pPr marL="3886200" indent="-228600" algn="l" defTabSz="914400" rtl="0" eaLnBrk="1" latinLnBrk="0" hangingPunct="1">
+              <a:lnSpc>
+                <a:spcPct val="90000"/>
+              </a:lnSpc>
+              <a:spcBef>
+                <a:spcPts val="500"/>
+              </a:spcBef>
+              <a:buFont typeface="Arial" panose="020B0604020202020204" pitchFamily="34" charset="0"/>
+              <a:buChar char="•"/>
+              <a:defRPr sz="1800" kern="1200">
+                <a:solidFill>
+                  <a:schemeClr val="tx1"/>
+                </a:solidFill>
+                <a:latin typeface="+mn-lt"/>
+                <a:ea typeface="+mn-ea"/>
+                <a:cs typeface="+mn-cs"/>
+              </a:defRPr>
+            </a:lvl9pPr>
+          </a:lstStyle>
+          <a:p>
+            <a:pPr marL="0" indent="0">
+              <a:buNone/>
+            </a:pPr>
+            <a:endParaRPr lang="en-US" dirty="0"/>
+          </a:p>
+        </p:txBody>
+      </p:sp>
+      <p:pic>
+        <p:nvPicPr>
+          <p:cNvPr id="10" name="Picture 9">
+            <a:extLst>
+              <a:ext uri="{FF2B5EF4-FFF2-40B4-BE49-F238E27FC236}">
+                <a16:creationId xmlns:a16="http://schemas.microsoft.com/office/drawing/2014/main" id="{E4860A78-64DD-4E4A-8273-4B6A0FC66D93}"/>
+              </a:ext>
+            </a:extLst>
+          </p:cNvPr>
+          <p:cNvPicPr>
+            <a:picLocks noChangeAspect="1"/>
+          </p:cNvPicPr>
+          <p:nvPr/>
+        </p:nvPicPr>
+        <p:blipFill>
+          <a:blip r:embed="rId3"/>
+          <a:stretch>
+            <a:fillRect/>
+          </a:stretch>
+        </p:blipFill>
+        <p:spPr>
+          <a:xfrm>
+            <a:off x="427442" y="4432706"/>
+            <a:ext cx="5416492" cy="827978"/>
+          </a:xfrm>
+          <a:prstGeom prst="rect">
+            <a:avLst/>
+          </a:prstGeom>
+        </p:spPr>
+      </p:pic>
+      <p:pic>
+        <p:nvPicPr>
+          <p:cNvPr id="5" name="Picture 4">
+            <a:extLst>
+              <a:ext uri="{FF2B5EF4-FFF2-40B4-BE49-F238E27FC236}">
+                <a16:creationId xmlns:a16="http://schemas.microsoft.com/office/drawing/2014/main" id="{80C80142-628F-4DE8-8905-E0A22C45F91C}"/>
+              </a:ext>
+            </a:extLst>
+          </p:cNvPr>
+          <p:cNvPicPr>
+            <a:picLocks noChangeAspect="1"/>
+          </p:cNvPicPr>
+          <p:nvPr/>
+        </p:nvPicPr>
+        <p:blipFill>
+          <a:blip r:embed="rId4"/>
+          <a:stretch>
+            <a:fillRect/>
+          </a:stretch>
+        </p:blipFill>
+        <p:spPr>
+          <a:xfrm>
+            <a:off x="6084887" y="2623605"/>
+            <a:ext cx="6107113" cy="1664007"/>
+          </a:xfrm>
+          <a:prstGeom prst="rect">
+            <a:avLst/>
+          </a:prstGeom>
+        </p:spPr>
+      </p:pic>
+      <p:pic>
+        <p:nvPicPr>
+          <p:cNvPr id="13" name="Picture 12">
+            <a:extLst>
+              <a:ext uri="{FF2B5EF4-FFF2-40B4-BE49-F238E27FC236}">
+                <a16:creationId xmlns:a16="http://schemas.microsoft.com/office/drawing/2014/main" id="{BFEC8A03-A882-48BF-A6E0-8F89E26257E1}"/>
+              </a:ext>
+            </a:extLst>
+          </p:cNvPr>
+          <p:cNvPicPr>
+            <a:picLocks noChangeAspect="1"/>
+          </p:cNvPicPr>
+          <p:nvPr/>
+        </p:nvPicPr>
+        <p:blipFill>
+          <a:blip r:embed="rId5"/>
+          <a:stretch>
+            <a:fillRect/>
+          </a:stretch>
+        </p:blipFill>
+        <p:spPr>
+          <a:xfrm>
+            <a:off x="6128132" y="4455195"/>
+            <a:ext cx="5848408" cy="842974"/>
+          </a:xfrm>
+          <a:prstGeom prst="rect">
+            <a:avLst/>
+          </a:prstGeom>
+        </p:spPr>
+      </p:pic>
     </p:spTree>
     <p:extLst>
       <p:ext uri="{BB962C8B-B14F-4D97-AF65-F5344CB8AC3E}">
-        <p14:creationId xmlns:p14="http://schemas.microsoft.com/office/powerpoint/2010/main" val="745880702"/>
+        <p14:creationId xmlns:p14="http://schemas.microsoft.com/office/powerpoint/2010/main" val="10790581"/>
       </p:ext>
     </p:extLst>
   </p:cSld>

</xml_diff>